<commit_message>
Added discussion of modus tollens
</commit_message>
<xml_diff>
--- a/04_Implication/Implication.pptx
+++ b/04_Implication/Implication.pptx
@@ -5,26 +5,27 @@
     <p:sldMasterId id="2147483648" r:id="rId1"/>
   </p:sldMasterIdLst>
   <p:notesMasterIdLst>
-    <p:notesMasterId r:id="rId19"/>
+    <p:notesMasterId r:id="rId20"/>
   </p:notesMasterIdLst>
   <p:sldIdLst>
     <p:sldId id="258" r:id="rId2"/>
     <p:sldId id="289" r:id="rId3"/>
     <p:sldId id="290" r:id="rId4"/>
     <p:sldId id="313" r:id="rId5"/>
-    <p:sldId id="314" r:id="rId6"/>
-    <p:sldId id="315" r:id="rId7"/>
-    <p:sldId id="316" r:id="rId8"/>
-    <p:sldId id="317" r:id="rId9"/>
-    <p:sldId id="318" r:id="rId10"/>
-    <p:sldId id="321" r:id="rId11"/>
-    <p:sldId id="319" r:id="rId12"/>
-    <p:sldId id="320" r:id="rId13"/>
-    <p:sldId id="322" r:id="rId14"/>
-    <p:sldId id="323" r:id="rId15"/>
-    <p:sldId id="324" r:id="rId16"/>
-    <p:sldId id="325" r:id="rId17"/>
-    <p:sldId id="261" r:id="rId18"/>
+    <p:sldId id="326" r:id="rId6"/>
+    <p:sldId id="314" r:id="rId7"/>
+    <p:sldId id="315" r:id="rId8"/>
+    <p:sldId id="316" r:id="rId9"/>
+    <p:sldId id="317" r:id="rId10"/>
+    <p:sldId id="318" r:id="rId11"/>
+    <p:sldId id="321" r:id="rId12"/>
+    <p:sldId id="319" r:id="rId13"/>
+    <p:sldId id="320" r:id="rId14"/>
+    <p:sldId id="322" r:id="rId15"/>
+    <p:sldId id="323" r:id="rId16"/>
+    <p:sldId id="324" r:id="rId17"/>
+    <p:sldId id="325" r:id="rId18"/>
+    <p:sldId id="261" r:id="rId19"/>
   </p:sldIdLst>
   <p:sldSz cx="12192000" cy="6858000"/>
   <p:notesSz cx="6858000" cy="9144000"/>
@@ -3527,6 +3528,226 @@
               <p:cNvPr id="2" name="Title 1">
                 <a:extLst>
                   <a:ext uri="{FF2B5EF4-FFF2-40B4-BE49-F238E27FC236}">
+                    <a16:creationId xmlns:a16="http://schemas.microsoft.com/office/drawing/2014/main" id="{1CE23325-16EF-B648-A91A-1BC50D6D0E94}"/>
+                  </a:ext>
+                </a:extLst>
+              </p:cNvPr>
+              <p:cNvSpPr>
+                <a:spLocks noGrp="1"/>
+              </p:cNvSpPr>
+              <p:nvPr>
+                <p:ph type="title"/>
+              </p:nvPr>
+            </p:nvSpPr>
+            <p:spPr/>
+            <p:txBody>
+              <a:bodyPr/>
+              <a:lstStyle/>
+              <a:p>
+                <a:r>
+                  <a:rPr lang="en-US" dirty="0"/>
+                  <a:t>Proof of true </a:t>
+                </a:r>
+                <a14:m>
+                  <m:oMath xmlns:m="http://schemas.openxmlformats.org/officeDocument/2006/math">
+                    <m:r>
+                      <a:rPr lang="en-US" i="1">
+                        <a:latin typeface="Cambria Math" panose="02040503050406030204" pitchFamily="18" charset="0"/>
+                      </a:rPr>
+                      <m:t>→</m:t>
+                    </m:r>
+                  </m:oMath>
+                </a14:m>
+                <a:r>
+                  <a:rPr lang="en-US" dirty="0"/>
+                  <a:t> true </a:t>
+                </a:r>
+              </a:p>
+            </p:txBody>
+          </p:sp>
+        </mc:Choice>
+        <mc:Fallback>
+          <p:sp>
+            <p:nvSpPr>
+              <p:cNvPr id="2" name="Title 1">
+                <a:extLst>
+                  <a:ext uri="{FF2B5EF4-FFF2-40B4-BE49-F238E27FC236}">
+                    <a16:creationId xmlns:a16="http://schemas.microsoft.com/office/drawing/2014/main" id="{1CE23325-16EF-B648-A91A-1BC50D6D0E94}"/>
+                  </a:ext>
+                </a:extLst>
+              </p:cNvPr>
+              <p:cNvSpPr>
+                <a:spLocks noGrp="1" noRot="1" noChangeAspect="1" noMove="1" noResize="1" noEditPoints="1" noAdjustHandles="1" noChangeArrowheads="1" noChangeShapeType="1" noTextEdit="1"/>
+              </p:cNvSpPr>
+              <p:nvPr>
+                <p:ph type="title"/>
+              </p:nvPr>
+            </p:nvSpPr>
+            <p:spPr>
+              <a:blipFill>
+                <a:blip r:embed="rId2"/>
+                <a:stretch>
+                  <a:fillRect l="-2292"/>
+                </a:stretch>
+              </a:blipFill>
+            </p:spPr>
+            <p:txBody>
+              <a:bodyPr/>
+              <a:lstStyle/>
+              <a:p>
+                <a:r>
+                  <a:rPr lang="en-US">
+                    <a:noFill/>
+                  </a:rPr>
+                  <a:t> </a:t>
+                </a:r>
+              </a:p>
+            </p:txBody>
+          </p:sp>
+        </mc:Fallback>
+      </mc:AlternateContent>
+      <p:sp>
+        <p:nvSpPr>
+          <p:cNvPr id="3" name="Content Placeholder 2">
+            <a:extLst>
+              <a:ext uri="{FF2B5EF4-FFF2-40B4-BE49-F238E27FC236}">
+                <a16:creationId xmlns:a16="http://schemas.microsoft.com/office/drawing/2014/main" id="{4F2A30D4-3683-3149-A141-3690026BFD9B}"/>
+              </a:ext>
+            </a:extLst>
+          </p:cNvPr>
+          <p:cNvSpPr>
+            <a:spLocks noGrp="1"/>
+          </p:cNvSpPr>
+          <p:nvPr>
+            <p:ph idx="1"/>
+          </p:nvPr>
+        </p:nvSpPr>
+        <p:spPr/>
+        <p:txBody>
+          <a:bodyPr/>
+          <a:lstStyle/>
+          <a:p>
+            <a:pPr marL="0" indent="0">
+              <a:buNone/>
+            </a:pPr>
+            <a:r>
+              <a:rPr lang="en-US" sz="2400" dirty="0">
+                <a:latin typeface="Courier New" panose="02070309020205020404" pitchFamily="49" charset="0"/>
+                <a:cs typeface="Courier New" panose="02070309020205020404" pitchFamily="49" charset="0"/>
+              </a:rPr>
+              <a:t>def </a:t>
+            </a:r>
+            <a:r>
+              <a:rPr lang="en-US" sz="2400" dirty="0" err="1">
+                <a:latin typeface="Courier New" panose="02070309020205020404" pitchFamily="49" charset="0"/>
+                <a:cs typeface="Courier New" panose="02070309020205020404" pitchFamily="49" charset="0"/>
+              </a:rPr>
+              <a:t>timpt</a:t>
+            </a:r>
+            <a:r>
+              <a:rPr lang="en-US" sz="2400" dirty="0">
+                <a:latin typeface="Courier New" panose="02070309020205020404" pitchFamily="49" charset="0"/>
+                <a:cs typeface="Courier New" panose="02070309020205020404" pitchFamily="49" charset="0"/>
+              </a:rPr>
+              <a:t> ( </a:t>
+            </a:r>
+            <a:r>
+              <a:rPr lang="en-US" sz="2400" dirty="0" err="1">
+                <a:latin typeface="Courier New" panose="02070309020205020404" pitchFamily="49" charset="0"/>
+                <a:cs typeface="Courier New" panose="02070309020205020404" pitchFamily="49" charset="0"/>
+              </a:rPr>
+              <a:t>pf_true</a:t>
+            </a:r>
+            <a:r>
+              <a:rPr lang="en-US" sz="2400" dirty="0">
+                <a:latin typeface="Courier New" panose="02070309020205020404" pitchFamily="49" charset="0"/>
+                <a:cs typeface="Courier New" panose="02070309020205020404" pitchFamily="49" charset="0"/>
+              </a:rPr>
+              <a:t>: true ) : true := </a:t>
+            </a:r>
+            <a:r>
+              <a:rPr lang="en-US" sz="2400" dirty="0" err="1">
+                <a:latin typeface="Courier New" panose="02070309020205020404" pitchFamily="49" charset="0"/>
+                <a:cs typeface="Courier New" panose="02070309020205020404" pitchFamily="49" charset="0"/>
+              </a:rPr>
+              <a:t>pf_true</a:t>
+            </a:r>
+            <a:endParaRPr lang="en-US" sz="2400" dirty="0">
+              <a:latin typeface="Courier New" panose="02070309020205020404" pitchFamily="49" charset="0"/>
+              <a:cs typeface="Courier New" panose="02070309020205020404" pitchFamily="49" charset="0"/>
+            </a:endParaRPr>
+          </a:p>
+          <a:p>
+            <a:pPr marL="0" indent="0">
+              <a:buNone/>
+            </a:pPr>
+            <a:br>
+              <a:rPr lang="en-US" sz="2400" dirty="0">
+                <a:latin typeface="Courier New" panose="02070309020205020404" pitchFamily="49" charset="0"/>
+                <a:cs typeface="Courier New" panose="02070309020205020404" pitchFamily="49" charset="0"/>
+              </a:rPr>
+            </a:br>
+            <a:r>
+              <a:rPr lang="en-US" sz="2400" dirty="0">
+                <a:latin typeface="Courier New" panose="02070309020205020404" pitchFamily="49" charset="0"/>
+                <a:cs typeface="Courier New" panose="02070309020205020404" pitchFamily="49" charset="0"/>
+              </a:rPr>
+              <a:t>#check </a:t>
+            </a:r>
+            <a:r>
+              <a:rPr lang="en-US" sz="2400" dirty="0" err="1">
+                <a:latin typeface="Courier New" panose="02070309020205020404" pitchFamily="49" charset="0"/>
+                <a:cs typeface="Courier New" panose="02070309020205020404" pitchFamily="49" charset="0"/>
+              </a:rPr>
+              <a:t>timpt</a:t>
+            </a:r>
+            <a:endParaRPr lang="en-US" sz="2400" dirty="0">
+              <a:latin typeface="Courier New" panose="02070309020205020404" pitchFamily="49" charset="0"/>
+              <a:cs typeface="Courier New" panose="02070309020205020404" pitchFamily="49" charset="0"/>
+            </a:endParaRPr>
+          </a:p>
+          <a:p>
+            <a:endParaRPr lang="en-US" dirty="0"/>
+          </a:p>
+        </p:txBody>
+      </p:sp>
+    </p:spTree>
+    <p:extLst>
+      <p:ext uri="{BB962C8B-B14F-4D97-AF65-F5344CB8AC3E}">
+        <p14:creationId xmlns:p14="http://schemas.microsoft.com/office/powerpoint/2010/main" val="903477720"/>
+      </p:ext>
+    </p:extLst>
+  </p:cSld>
+  <p:clrMapOvr>
+    <a:masterClrMapping/>
+  </p:clrMapOvr>
+</p:sld>
+</file>
+
+<file path=ppt/slides/slide11.xml><?xml version="1.0" encoding="utf-8"?>
+<p:sld xmlns:a="http://schemas.openxmlformats.org/drawingml/2006/main" xmlns:r="http://schemas.openxmlformats.org/officeDocument/2006/relationships" xmlns:p="http://schemas.openxmlformats.org/presentationml/2006/main">
+  <p:cSld>
+    <p:spTree>
+      <p:nvGrpSpPr>
+        <p:cNvPr id="1" name=""/>
+        <p:cNvGrpSpPr/>
+        <p:nvPr/>
+      </p:nvGrpSpPr>
+      <p:grpSpPr>
+        <a:xfrm>
+          <a:off x="0" y="0"/>
+          <a:ext cx="0" cy="0"/>
+          <a:chOff x="0" y="0"/>
+          <a:chExt cx="0" cy="0"/>
+        </a:xfrm>
+      </p:grpSpPr>
+      <mc:AlternateContent xmlns:mc="http://schemas.openxmlformats.org/markup-compatibility/2006">
+        <mc:Choice xmlns:a14="http://schemas.microsoft.com/office/drawing/2010/main" Requires="a14">
+          <p:sp>
+            <p:nvSpPr>
+              <p:cNvPr id="2" name="Title 1">
+                <a:extLst>
+                  <a:ext uri="{FF2B5EF4-FFF2-40B4-BE49-F238E27FC236}">
                     <a16:creationId xmlns:a16="http://schemas.microsoft.com/office/drawing/2014/main" id="{BBA3F55F-9ECF-344D-A263-BF7E680591AE}"/>
                   </a:ext>
                 </a:extLst>
@@ -3954,234 +4175,6 @@
 </p:sld>
 </file>
 
-<file path=ppt/slides/slide11.xml><?xml version="1.0" encoding="utf-8"?>
-<p:sld xmlns:a="http://schemas.openxmlformats.org/drawingml/2006/main" xmlns:r="http://schemas.openxmlformats.org/officeDocument/2006/relationships" xmlns:p="http://schemas.openxmlformats.org/presentationml/2006/main">
-  <p:cSld>
-    <p:spTree>
-      <p:nvGrpSpPr>
-        <p:cNvPr id="1" name=""/>
-        <p:cNvGrpSpPr/>
-        <p:nvPr/>
-      </p:nvGrpSpPr>
-      <p:grpSpPr>
-        <a:xfrm>
-          <a:off x="0" y="0"/>
-          <a:ext cx="0" cy="0"/>
-          <a:chOff x="0" y="0"/>
-          <a:chExt cx="0" cy="0"/>
-        </a:xfrm>
-      </p:grpSpPr>
-      <mc:AlternateContent xmlns:mc="http://schemas.openxmlformats.org/markup-compatibility/2006">
-        <mc:Choice xmlns:a14="http://schemas.microsoft.com/office/drawing/2010/main" Requires="a14">
-          <p:sp>
-            <p:nvSpPr>
-              <p:cNvPr id="2" name="Title 1">
-                <a:extLst>
-                  <a:ext uri="{FF2B5EF4-FFF2-40B4-BE49-F238E27FC236}">
-                    <a16:creationId xmlns:a16="http://schemas.microsoft.com/office/drawing/2014/main" id="{1CE23325-16EF-B648-A91A-1BC50D6D0E94}"/>
-                  </a:ext>
-                </a:extLst>
-              </p:cNvPr>
-              <p:cNvSpPr>
-                <a:spLocks noGrp="1"/>
-              </p:cNvSpPr>
-              <p:nvPr>
-                <p:ph type="title"/>
-              </p:nvPr>
-            </p:nvSpPr>
-            <p:spPr/>
-            <p:txBody>
-              <a:bodyPr/>
-              <a:lstStyle/>
-              <a:p>
-                <a:r>
-                  <a:rPr lang="en-US" dirty="0"/>
-                  <a:t>Proof of false </a:t>
-                </a:r>
-                <a14:m>
-                  <m:oMath xmlns:m="http://schemas.openxmlformats.org/officeDocument/2006/math">
-                    <m:r>
-                      <a:rPr lang="en-US" i="1">
-                        <a:latin typeface="Cambria Math" panose="02040503050406030204" pitchFamily="18" charset="0"/>
-                      </a:rPr>
-                      <m:t>→</m:t>
-                    </m:r>
-                  </m:oMath>
-                </a14:m>
-                <a:r>
-                  <a:rPr lang="en-US" dirty="0"/>
-                  <a:t> true </a:t>
-                </a:r>
-              </a:p>
-            </p:txBody>
-          </p:sp>
-        </mc:Choice>
-        <mc:Fallback>
-          <p:sp>
-            <p:nvSpPr>
-              <p:cNvPr id="2" name="Title 1">
-                <a:extLst>
-                  <a:ext uri="{FF2B5EF4-FFF2-40B4-BE49-F238E27FC236}">
-                    <a16:creationId xmlns:a16="http://schemas.microsoft.com/office/drawing/2014/main" id="{1CE23325-16EF-B648-A91A-1BC50D6D0E94}"/>
-                  </a:ext>
-                </a:extLst>
-              </p:cNvPr>
-              <p:cNvSpPr>
-                <a:spLocks noGrp="1" noRot="1" noChangeAspect="1" noMove="1" noResize="1" noEditPoints="1" noAdjustHandles="1" noChangeArrowheads="1" noChangeShapeType="1" noTextEdit="1"/>
-              </p:cNvSpPr>
-              <p:nvPr>
-                <p:ph type="title"/>
-              </p:nvPr>
-            </p:nvSpPr>
-            <p:spPr>
-              <a:blipFill>
-                <a:blip r:embed="rId2"/>
-                <a:stretch>
-                  <a:fillRect l="-2292"/>
-                </a:stretch>
-              </a:blipFill>
-            </p:spPr>
-            <p:txBody>
-              <a:bodyPr/>
-              <a:lstStyle/>
-              <a:p>
-                <a:r>
-                  <a:rPr lang="en-US">
-                    <a:noFill/>
-                  </a:rPr>
-                  <a:t> </a:t>
-                </a:r>
-              </a:p>
-            </p:txBody>
-          </p:sp>
-        </mc:Fallback>
-      </mc:AlternateContent>
-      <p:sp>
-        <p:nvSpPr>
-          <p:cNvPr id="3" name="Content Placeholder 2">
-            <a:extLst>
-              <a:ext uri="{FF2B5EF4-FFF2-40B4-BE49-F238E27FC236}">
-                <a16:creationId xmlns:a16="http://schemas.microsoft.com/office/drawing/2014/main" id="{4F2A30D4-3683-3149-A141-3690026BFD9B}"/>
-              </a:ext>
-            </a:extLst>
-          </p:cNvPr>
-          <p:cNvSpPr>
-            <a:spLocks noGrp="1"/>
-          </p:cNvSpPr>
-          <p:nvPr>
-            <p:ph idx="1"/>
-          </p:nvPr>
-        </p:nvSpPr>
-        <p:spPr>
-          <a:xfrm>
-            <a:off x="838200" y="1825625"/>
-            <a:ext cx="10841736" cy="4351338"/>
-          </a:xfrm>
-        </p:spPr>
-        <p:txBody>
-          <a:bodyPr/>
-          <a:lstStyle/>
-          <a:p>
-            <a:pPr marL="0" indent="0">
-              <a:buNone/>
-            </a:pPr>
-            <a:r>
-              <a:rPr lang="en-US" dirty="0">
-                <a:latin typeface="Courier New" panose="02070309020205020404" pitchFamily="49" charset="0"/>
-                <a:cs typeface="Courier New" panose="02070309020205020404" pitchFamily="49" charset="0"/>
-              </a:rPr>
-              <a:t>def </a:t>
-            </a:r>
-            <a:r>
-              <a:rPr lang="en-US" dirty="0" err="1">
-                <a:latin typeface="Courier New" panose="02070309020205020404" pitchFamily="49" charset="0"/>
-                <a:cs typeface="Courier New" panose="02070309020205020404" pitchFamily="49" charset="0"/>
-              </a:rPr>
-              <a:t>fimpt</a:t>
-            </a:r>
-            <a:r>
-              <a:rPr lang="en-US" dirty="0">
-                <a:latin typeface="Courier New" panose="02070309020205020404" pitchFamily="49" charset="0"/>
-                <a:cs typeface="Courier New" panose="02070309020205020404" pitchFamily="49" charset="0"/>
-              </a:rPr>
-              <a:t> ( </a:t>
-            </a:r>
-            <a:r>
-              <a:rPr lang="en-US" dirty="0" err="1">
-                <a:latin typeface="Courier New" panose="02070309020205020404" pitchFamily="49" charset="0"/>
-                <a:cs typeface="Courier New" panose="02070309020205020404" pitchFamily="49" charset="0"/>
-              </a:rPr>
-              <a:t>pf_false</a:t>
-            </a:r>
-            <a:r>
-              <a:rPr lang="en-US" dirty="0">
-                <a:latin typeface="Courier New" panose="02070309020205020404" pitchFamily="49" charset="0"/>
-                <a:cs typeface="Courier New" panose="02070309020205020404" pitchFamily="49" charset="0"/>
-              </a:rPr>
-              <a:t>: false ) : true := </a:t>
-            </a:r>
-            <a:r>
-              <a:rPr lang="en-US" dirty="0" err="1">
-                <a:latin typeface="Courier New" panose="02070309020205020404" pitchFamily="49" charset="0"/>
-                <a:cs typeface="Courier New" panose="02070309020205020404" pitchFamily="49" charset="0"/>
-              </a:rPr>
-              <a:t>true.intro</a:t>
-            </a:r>
-            <a:endParaRPr lang="en-US" dirty="0">
-              <a:latin typeface="Courier New" panose="02070309020205020404" pitchFamily="49" charset="0"/>
-              <a:cs typeface="Courier New" panose="02070309020205020404" pitchFamily="49" charset="0"/>
-            </a:endParaRPr>
-          </a:p>
-          <a:p>
-            <a:pPr marL="0" indent="0">
-              <a:buNone/>
-            </a:pPr>
-            <a:br>
-              <a:rPr lang="en-US" dirty="0">
-                <a:latin typeface="Courier New" panose="02070309020205020404" pitchFamily="49" charset="0"/>
-                <a:cs typeface="Courier New" panose="02070309020205020404" pitchFamily="49" charset="0"/>
-              </a:rPr>
-            </a:br>
-            <a:r>
-              <a:rPr lang="en-US" dirty="0">
-                <a:latin typeface="Courier New" panose="02070309020205020404" pitchFamily="49" charset="0"/>
-                <a:cs typeface="Courier New" panose="02070309020205020404" pitchFamily="49" charset="0"/>
-              </a:rPr>
-              <a:t>#check </a:t>
-            </a:r>
-            <a:r>
-              <a:rPr lang="en-US" dirty="0" err="1">
-                <a:latin typeface="Courier New" panose="02070309020205020404" pitchFamily="49" charset="0"/>
-                <a:cs typeface="Courier New" panose="02070309020205020404" pitchFamily="49" charset="0"/>
-              </a:rPr>
-              <a:t>fimpt</a:t>
-            </a:r>
-            <a:endParaRPr lang="en-US" dirty="0">
-              <a:latin typeface="Courier New" panose="02070309020205020404" pitchFamily="49" charset="0"/>
-              <a:cs typeface="Courier New" panose="02070309020205020404" pitchFamily="49" charset="0"/>
-            </a:endParaRPr>
-          </a:p>
-          <a:p>
-            <a:pPr marL="0" indent="0">
-              <a:buNone/>
-            </a:pPr>
-            <a:endParaRPr lang="en-US" dirty="0"/>
-          </a:p>
-        </p:txBody>
-      </p:sp>
-    </p:spTree>
-    <p:extLst>
-      <p:ext uri="{BB962C8B-B14F-4D97-AF65-F5344CB8AC3E}">
-        <p14:creationId xmlns:p14="http://schemas.microsoft.com/office/powerpoint/2010/main" val="3990153398"/>
-      </p:ext>
-    </p:extLst>
-  </p:cSld>
-  <p:clrMapOvr>
-    <a:masterClrMapping/>
-  </p:clrMapOvr>
-</p:sld>
-</file>
-
 <file path=ppt/slides/slide12.xml><?xml version="1.0" encoding="utf-8"?>
 <p:sld xmlns:a="http://schemas.openxmlformats.org/drawingml/2006/main" xmlns:r="http://schemas.openxmlformats.org/officeDocument/2006/relationships" xmlns:p="http://schemas.openxmlformats.org/presentationml/2006/main">
   <p:cSld>
@@ -4238,7 +4231,7 @@
                 </a14:m>
                 <a:r>
                   <a:rPr lang="en-US" dirty="0"/>
-                  <a:t> false </a:t>
+                  <a:t> true </a:t>
                 </a:r>
               </a:p>
             </p:txBody>
@@ -4300,6 +4293,234 @@
             <p:ph idx="1"/>
           </p:nvPr>
         </p:nvSpPr>
+        <p:spPr>
+          <a:xfrm>
+            <a:off x="838200" y="1825625"/>
+            <a:ext cx="10841736" cy="4351338"/>
+          </a:xfrm>
+        </p:spPr>
+        <p:txBody>
+          <a:bodyPr/>
+          <a:lstStyle/>
+          <a:p>
+            <a:pPr marL="0" indent="0">
+              <a:buNone/>
+            </a:pPr>
+            <a:r>
+              <a:rPr lang="en-US" dirty="0">
+                <a:latin typeface="Courier New" panose="02070309020205020404" pitchFamily="49" charset="0"/>
+                <a:cs typeface="Courier New" panose="02070309020205020404" pitchFamily="49" charset="0"/>
+              </a:rPr>
+              <a:t>def </a:t>
+            </a:r>
+            <a:r>
+              <a:rPr lang="en-US" dirty="0" err="1">
+                <a:latin typeface="Courier New" panose="02070309020205020404" pitchFamily="49" charset="0"/>
+                <a:cs typeface="Courier New" panose="02070309020205020404" pitchFamily="49" charset="0"/>
+              </a:rPr>
+              <a:t>fimpt</a:t>
+            </a:r>
+            <a:r>
+              <a:rPr lang="en-US" dirty="0">
+                <a:latin typeface="Courier New" panose="02070309020205020404" pitchFamily="49" charset="0"/>
+                <a:cs typeface="Courier New" panose="02070309020205020404" pitchFamily="49" charset="0"/>
+              </a:rPr>
+              <a:t> ( </a:t>
+            </a:r>
+            <a:r>
+              <a:rPr lang="en-US" dirty="0" err="1">
+                <a:latin typeface="Courier New" panose="02070309020205020404" pitchFamily="49" charset="0"/>
+                <a:cs typeface="Courier New" panose="02070309020205020404" pitchFamily="49" charset="0"/>
+              </a:rPr>
+              <a:t>pf_false</a:t>
+            </a:r>
+            <a:r>
+              <a:rPr lang="en-US" dirty="0">
+                <a:latin typeface="Courier New" panose="02070309020205020404" pitchFamily="49" charset="0"/>
+                <a:cs typeface="Courier New" panose="02070309020205020404" pitchFamily="49" charset="0"/>
+              </a:rPr>
+              <a:t>: false ) : true := </a:t>
+            </a:r>
+            <a:r>
+              <a:rPr lang="en-US" dirty="0" err="1">
+                <a:latin typeface="Courier New" panose="02070309020205020404" pitchFamily="49" charset="0"/>
+                <a:cs typeface="Courier New" panose="02070309020205020404" pitchFamily="49" charset="0"/>
+              </a:rPr>
+              <a:t>true.intro</a:t>
+            </a:r>
+            <a:endParaRPr lang="en-US" dirty="0">
+              <a:latin typeface="Courier New" panose="02070309020205020404" pitchFamily="49" charset="0"/>
+              <a:cs typeface="Courier New" panose="02070309020205020404" pitchFamily="49" charset="0"/>
+            </a:endParaRPr>
+          </a:p>
+          <a:p>
+            <a:pPr marL="0" indent="0">
+              <a:buNone/>
+            </a:pPr>
+            <a:br>
+              <a:rPr lang="en-US" dirty="0">
+                <a:latin typeface="Courier New" panose="02070309020205020404" pitchFamily="49" charset="0"/>
+                <a:cs typeface="Courier New" panose="02070309020205020404" pitchFamily="49" charset="0"/>
+              </a:rPr>
+            </a:br>
+            <a:r>
+              <a:rPr lang="en-US" dirty="0">
+                <a:latin typeface="Courier New" panose="02070309020205020404" pitchFamily="49" charset="0"/>
+                <a:cs typeface="Courier New" panose="02070309020205020404" pitchFamily="49" charset="0"/>
+              </a:rPr>
+              <a:t>#check </a:t>
+            </a:r>
+            <a:r>
+              <a:rPr lang="en-US" dirty="0" err="1">
+                <a:latin typeface="Courier New" panose="02070309020205020404" pitchFamily="49" charset="0"/>
+                <a:cs typeface="Courier New" panose="02070309020205020404" pitchFamily="49" charset="0"/>
+              </a:rPr>
+              <a:t>fimpt</a:t>
+            </a:r>
+            <a:endParaRPr lang="en-US" dirty="0">
+              <a:latin typeface="Courier New" panose="02070309020205020404" pitchFamily="49" charset="0"/>
+              <a:cs typeface="Courier New" panose="02070309020205020404" pitchFamily="49" charset="0"/>
+            </a:endParaRPr>
+          </a:p>
+          <a:p>
+            <a:pPr marL="0" indent="0">
+              <a:buNone/>
+            </a:pPr>
+            <a:endParaRPr lang="en-US" dirty="0"/>
+          </a:p>
+        </p:txBody>
+      </p:sp>
+    </p:spTree>
+    <p:extLst>
+      <p:ext uri="{BB962C8B-B14F-4D97-AF65-F5344CB8AC3E}">
+        <p14:creationId xmlns:p14="http://schemas.microsoft.com/office/powerpoint/2010/main" val="3990153398"/>
+      </p:ext>
+    </p:extLst>
+  </p:cSld>
+  <p:clrMapOvr>
+    <a:masterClrMapping/>
+  </p:clrMapOvr>
+</p:sld>
+</file>
+
+<file path=ppt/slides/slide13.xml><?xml version="1.0" encoding="utf-8"?>
+<p:sld xmlns:a="http://schemas.openxmlformats.org/drawingml/2006/main" xmlns:r="http://schemas.openxmlformats.org/officeDocument/2006/relationships" xmlns:p="http://schemas.openxmlformats.org/presentationml/2006/main">
+  <p:cSld>
+    <p:spTree>
+      <p:nvGrpSpPr>
+        <p:cNvPr id="1" name=""/>
+        <p:cNvGrpSpPr/>
+        <p:nvPr/>
+      </p:nvGrpSpPr>
+      <p:grpSpPr>
+        <a:xfrm>
+          <a:off x="0" y="0"/>
+          <a:ext cx="0" cy="0"/>
+          <a:chOff x="0" y="0"/>
+          <a:chExt cx="0" cy="0"/>
+        </a:xfrm>
+      </p:grpSpPr>
+      <mc:AlternateContent xmlns:mc="http://schemas.openxmlformats.org/markup-compatibility/2006">
+        <mc:Choice xmlns:a14="http://schemas.microsoft.com/office/drawing/2010/main" Requires="a14">
+          <p:sp>
+            <p:nvSpPr>
+              <p:cNvPr id="2" name="Title 1">
+                <a:extLst>
+                  <a:ext uri="{FF2B5EF4-FFF2-40B4-BE49-F238E27FC236}">
+                    <a16:creationId xmlns:a16="http://schemas.microsoft.com/office/drawing/2014/main" id="{1CE23325-16EF-B648-A91A-1BC50D6D0E94}"/>
+                  </a:ext>
+                </a:extLst>
+              </p:cNvPr>
+              <p:cNvSpPr>
+                <a:spLocks noGrp="1"/>
+              </p:cNvSpPr>
+              <p:nvPr>
+                <p:ph type="title"/>
+              </p:nvPr>
+            </p:nvSpPr>
+            <p:spPr/>
+            <p:txBody>
+              <a:bodyPr/>
+              <a:lstStyle/>
+              <a:p>
+                <a:r>
+                  <a:rPr lang="en-US" dirty="0"/>
+                  <a:t>Proof of false </a:t>
+                </a:r>
+                <a14:m>
+                  <m:oMath xmlns:m="http://schemas.openxmlformats.org/officeDocument/2006/math">
+                    <m:r>
+                      <a:rPr lang="en-US" i="1">
+                        <a:latin typeface="Cambria Math" panose="02040503050406030204" pitchFamily="18" charset="0"/>
+                      </a:rPr>
+                      <m:t>→</m:t>
+                    </m:r>
+                  </m:oMath>
+                </a14:m>
+                <a:r>
+                  <a:rPr lang="en-US" dirty="0"/>
+                  <a:t> false </a:t>
+                </a:r>
+              </a:p>
+            </p:txBody>
+          </p:sp>
+        </mc:Choice>
+        <mc:Fallback>
+          <p:sp>
+            <p:nvSpPr>
+              <p:cNvPr id="2" name="Title 1">
+                <a:extLst>
+                  <a:ext uri="{FF2B5EF4-FFF2-40B4-BE49-F238E27FC236}">
+                    <a16:creationId xmlns:a16="http://schemas.microsoft.com/office/drawing/2014/main" id="{1CE23325-16EF-B648-A91A-1BC50D6D0E94}"/>
+                  </a:ext>
+                </a:extLst>
+              </p:cNvPr>
+              <p:cNvSpPr>
+                <a:spLocks noGrp="1" noRot="1" noChangeAspect="1" noMove="1" noResize="1" noEditPoints="1" noAdjustHandles="1" noChangeArrowheads="1" noChangeShapeType="1" noTextEdit="1"/>
+              </p:cNvSpPr>
+              <p:nvPr>
+                <p:ph type="title"/>
+              </p:nvPr>
+            </p:nvSpPr>
+            <p:spPr>
+              <a:blipFill>
+                <a:blip r:embed="rId2"/>
+                <a:stretch>
+                  <a:fillRect l="-2292"/>
+                </a:stretch>
+              </a:blipFill>
+            </p:spPr>
+            <p:txBody>
+              <a:bodyPr/>
+              <a:lstStyle/>
+              <a:p>
+                <a:r>
+                  <a:rPr lang="en-US">
+                    <a:noFill/>
+                  </a:rPr>
+                  <a:t> </a:t>
+                </a:r>
+              </a:p>
+            </p:txBody>
+          </p:sp>
+        </mc:Fallback>
+      </mc:AlternateContent>
+      <p:sp>
+        <p:nvSpPr>
+          <p:cNvPr id="3" name="Content Placeholder 2">
+            <a:extLst>
+              <a:ext uri="{FF2B5EF4-FFF2-40B4-BE49-F238E27FC236}">
+                <a16:creationId xmlns:a16="http://schemas.microsoft.com/office/drawing/2014/main" id="{4F2A30D4-3683-3149-A141-3690026BFD9B}"/>
+              </a:ext>
+            </a:extLst>
+          </p:cNvPr>
+          <p:cNvSpPr>
+            <a:spLocks noGrp="1"/>
+          </p:cNvSpPr>
+          <p:nvPr>
+            <p:ph idx="1"/>
+          </p:nvPr>
+        </p:nvSpPr>
         <p:spPr/>
         <p:txBody>
           <a:bodyPr/>
@@ -4405,7 +4626,7 @@
 </p:sld>
 </file>
 
-<file path=ppt/slides/slide13.xml><?xml version="1.0" encoding="utf-8"?>
+<file path=ppt/slides/slide14.xml><?xml version="1.0" encoding="utf-8"?>
 <p:sld xmlns:a="http://schemas.openxmlformats.org/drawingml/2006/main" xmlns:r="http://schemas.openxmlformats.org/officeDocument/2006/relationships" xmlns:p="http://schemas.openxmlformats.org/presentationml/2006/main">
   <p:cSld>
     <p:spTree>
@@ -4466,7 +4687,12 @@
             <p:ph idx="1"/>
           </p:nvPr>
         </p:nvSpPr>
-        <p:spPr/>
+        <p:spPr>
+          <a:xfrm>
+            <a:off x="838200" y="1728088"/>
+            <a:ext cx="10515600" cy="4806823"/>
+          </a:xfrm>
+        </p:spPr>
         <p:txBody>
           <a:bodyPr>
             <a:normAutofit/>
@@ -4488,9 +4714,9 @@
             <a:endParaRPr lang="en-US" dirty="0"/>
           </a:p>
           <a:p>
-            <a:endParaRPr lang="en-US" dirty="0"/>
-          </a:p>
-          <a:p>
+            <a:pPr marL="0" indent="0">
+              <a:buNone/>
+            </a:pPr>
             <a:endParaRPr lang="en-US" dirty="0"/>
           </a:p>
           <a:p>
@@ -4505,6 +4731,33 @@
               <a:rPr lang="en-US" dirty="0"/>
               <a:t>Implications are propositions themselves</a:t>
             </a:r>
+          </a:p>
+          <a:p>
+            <a:r>
+              <a:rPr lang="en-US" dirty="0"/>
+              <a:t>Important to note: a proposition implies false </a:t>
+            </a:r>
+            <a:r>
+              <a:rPr lang="en-US" dirty="0" err="1"/>
+              <a:t>iff</a:t>
+            </a:r>
+            <a:r>
+              <a:rPr lang="en-US" dirty="0"/>
+              <a:t> if the proposition </a:t>
+            </a:r>
+            <a:r>
+              <a:rPr lang="en-US" i="1" dirty="0"/>
+              <a:t>is</a:t>
+            </a:r>
+            <a:r>
+              <a:rPr lang="en-US" dirty="0"/>
+              <a:t> false, but implying true does not mean </a:t>
+            </a:r>
+            <a:r>
+              <a:rPr lang="en-US"/>
+              <a:t>the proposition is true</a:t>
+            </a:r>
+            <a:endParaRPr lang="en-US" dirty="0"/>
           </a:p>
         </p:txBody>
       </p:sp>
@@ -4525,13 +4778,13 @@
               <p:nvPr>
                 <p:extLst>
                   <p:ext uri="{D42A27DB-BD31-4B8C-83A1-F6EECF244321}">
-                    <p14:modId xmlns:p14="http://schemas.microsoft.com/office/powerpoint/2010/main" val="2647944919"/>
+                    <p14:modId xmlns:p14="http://schemas.microsoft.com/office/powerpoint/2010/main" val="1342756764"/>
                   </p:ext>
                 </p:extLst>
               </p:nvPr>
             </p:nvGraphicFramePr>
             <p:xfrm>
-              <a:off x="1885696" y="2493963"/>
+              <a:off x="1873504" y="2277299"/>
               <a:ext cx="8127999" cy="1854200"/>
             </p:xfrm>
             <a:graphic>
@@ -4888,13 +5141,13 @@
               <p:nvPr>
                 <p:extLst>
                   <p:ext uri="{D42A27DB-BD31-4B8C-83A1-F6EECF244321}">
-                    <p14:modId xmlns:p14="http://schemas.microsoft.com/office/powerpoint/2010/main" val="2647944919"/>
+                    <p14:modId xmlns:p14="http://schemas.microsoft.com/office/powerpoint/2010/main" val="1342756764"/>
                   </p:ext>
                 </p:extLst>
               </p:nvPr>
             </p:nvGraphicFramePr>
             <p:xfrm>
-              <a:off x="1885696" y="2493963"/>
+              <a:off x="1873504" y="2277299"/>
               <a:ext cx="8127999" cy="1854200"/>
             </p:xfrm>
             <a:graphic>
@@ -4985,7 +5238,7 @@
                         <a:blipFill>
                           <a:blip r:embed="rId2"/>
                           <a:stretch>
-                            <a:fillRect l="-467" t="-103333" r="-200000" b="-313333"/>
+                            <a:fillRect l="-467" t="-103333" r="-200000" b="-316667"/>
                           </a:stretch>
                         </a:blipFill>
                       </a:tcPr>
@@ -5035,7 +5288,7 @@
                         <a:blipFill>
                           <a:blip r:embed="rId2"/>
                           <a:stretch>
-                            <a:fillRect l="-467" t="-210345" r="-200000" b="-224138"/>
+                            <a:fillRect l="-467" t="-210345" r="-200000" b="-227586"/>
                           </a:stretch>
                         </a:blipFill>
                       </a:tcPr>
@@ -5085,7 +5338,7 @@
                         <a:blipFill>
                           <a:blip r:embed="rId2"/>
                           <a:stretch>
-                            <a:fillRect l="-467" t="-300000" r="-200000" b="-116667"/>
+                            <a:fillRect l="-467" t="-300000" r="-200000" b="-120000"/>
                           </a:stretch>
                         </a:blipFill>
                       </a:tcPr>
@@ -5136,7 +5389,7 @@
                         <a:blipFill>
                           <a:blip r:embed="rId2"/>
                           <a:stretch>
-                            <a:fillRect l="-467" t="-413793" r="-200000" b="-20690"/>
+                            <a:fillRect l="-467" t="-413793" r="-200000" b="-24138"/>
                           </a:stretch>
                         </a:blipFill>
                       </a:tcPr>
@@ -5209,361 +5462,6 @@
 </p:sld>
 </file>
 
-<file path=ppt/slides/slide14.xml><?xml version="1.0" encoding="utf-8"?>
-<p:sld xmlns:a="http://schemas.openxmlformats.org/drawingml/2006/main" xmlns:r="http://schemas.openxmlformats.org/officeDocument/2006/relationships" xmlns:p="http://schemas.openxmlformats.org/presentationml/2006/main">
-  <p:cSld>
-    <p:spTree>
-      <p:nvGrpSpPr>
-        <p:cNvPr id="1" name=""/>
-        <p:cNvGrpSpPr/>
-        <p:nvPr/>
-      </p:nvGrpSpPr>
-      <p:grpSpPr>
-        <a:xfrm>
-          <a:off x="0" y="0"/>
-          <a:ext cx="0" cy="0"/>
-          <a:chOff x="0" y="0"/>
-          <a:chExt cx="0" cy="0"/>
-        </a:xfrm>
-      </p:grpSpPr>
-      <mc:AlternateContent xmlns:mc="http://schemas.openxmlformats.org/markup-compatibility/2006">
-        <mc:Choice xmlns:a14="http://schemas.microsoft.com/office/drawing/2010/main" Requires="a14">
-          <p:sp>
-            <p:nvSpPr>
-              <p:cNvPr id="2" name="Title 1">
-                <a:extLst>
-                  <a:ext uri="{FF2B5EF4-FFF2-40B4-BE49-F238E27FC236}">
-                    <a16:creationId xmlns:a16="http://schemas.microsoft.com/office/drawing/2014/main" id="{BAC9F285-0B24-ED44-8446-5DCC3786C121}"/>
-                  </a:ext>
-                </a:extLst>
-              </p:cNvPr>
-              <p:cNvSpPr>
-                <a:spLocks noGrp="1"/>
-              </p:cNvSpPr>
-              <p:nvPr>
-                <p:ph type="title"/>
-              </p:nvPr>
-            </p:nvSpPr>
-            <p:spPr/>
-            <p:txBody>
-              <a:bodyPr/>
-              <a:lstStyle/>
-              <a:p>
-                <a14:m>
-                  <m:oMath xmlns:m="http://schemas.openxmlformats.org/officeDocument/2006/math">
-                    <m:r>
-                      <a:rPr lang="en-US" i="1">
-                        <a:latin typeface="Cambria Math" panose="02040503050406030204" pitchFamily="18" charset="0"/>
-                      </a:rPr>
-                      <m:t>→</m:t>
-                    </m:r>
-                  </m:oMath>
-                </a14:m>
-                <a:r>
-                  <a:rPr lang="en-US" dirty="0"/>
-                  <a:t> introduction rules</a:t>
-                </a:r>
-              </a:p>
-            </p:txBody>
-          </p:sp>
-        </mc:Choice>
-        <mc:Fallback>
-          <p:sp>
-            <p:nvSpPr>
-              <p:cNvPr id="2" name="Title 1">
-                <a:extLst>
-                  <a:ext uri="{FF2B5EF4-FFF2-40B4-BE49-F238E27FC236}">
-                    <a16:creationId xmlns:a16="http://schemas.microsoft.com/office/drawing/2014/main" id="{BAC9F285-0B24-ED44-8446-5DCC3786C121}"/>
-                  </a:ext>
-                </a:extLst>
-              </p:cNvPr>
-              <p:cNvSpPr>
-                <a:spLocks noGrp="1" noRot="1" noChangeAspect="1" noMove="1" noResize="1" noEditPoints="1" noAdjustHandles="1" noChangeArrowheads="1" noChangeShapeType="1" noTextEdit="1"/>
-              </p:cNvSpPr>
-              <p:nvPr>
-                <p:ph type="title"/>
-              </p:nvPr>
-            </p:nvSpPr>
-            <p:spPr>
-              <a:blipFill>
-                <a:blip r:embed="rId2"/>
-                <a:stretch>
-                  <a:fillRect l="-362"/>
-                </a:stretch>
-              </a:blipFill>
-            </p:spPr>
-            <p:txBody>
-              <a:bodyPr/>
-              <a:lstStyle/>
-              <a:p>
-                <a:r>
-                  <a:rPr lang="en-US">
-                    <a:noFill/>
-                  </a:rPr>
-                  <a:t> </a:t>
-                </a:r>
-              </a:p>
-            </p:txBody>
-          </p:sp>
-        </mc:Fallback>
-      </mc:AlternateContent>
-      <mc:AlternateContent xmlns:mc="http://schemas.openxmlformats.org/markup-compatibility/2006">
-        <mc:Choice xmlns:a14="http://schemas.microsoft.com/office/drawing/2010/main" Requires="a14">
-          <p:sp>
-            <p:nvSpPr>
-              <p:cNvPr id="3" name="Content Placeholder 2">
-                <a:extLst>
-                  <a:ext uri="{FF2B5EF4-FFF2-40B4-BE49-F238E27FC236}">
-                    <a16:creationId xmlns:a16="http://schemas.microsoft.com/office/drawing/2014/main" id="{D8B0F1D2-6611-BE48-BDBD-52834D05CF3A}"/>
-                  </a:ext>
-                </a:extLst>
-              </p:cNvPr>
-              <p:cNvSpPr>
-                <a:spLocks noGrp="1"/>
-              </p:cNvSpPr>
-              <p:nvPr>
-                <p:ph idx="1"/>
-              </p:nvPr>
-            </p:nvSpPr>
-            <p:spPr/>
-            <p:txBody>
-              <a:bodyPr>
-                <a:normAutofit/>
-              </a:bodyPr>
-              <a:lstStyle/>
-              <a:p>
-                <a:r>
-                  <a:rPr lang="en-US" dirty="0"/>
-                  <a:t>The </a:t>
-                </a:r>
-                <a14:m>
-                  <m:oMath xmlns:m="http://schemas.openxmlformats.org/officeDocument/2006/math">
-                    <m:r>
-                      <a:rPr lang="en-US" i="1">
-                        <a:latin typeface="Cambria Math" panose="02040503050406030204" pitchFamily="18" charset="0"/>
-                      </a:rPr>
-                      <m:t>→</m:t>
-                    </m:r>
-                  </m:oMath>
-                </a14:m>
-                <a:r>
-                  <a:rPr lang="en-US" dirty="0"/>
-                  <a:t> introduction rules say that if assuming that there is proof of </a:t>
-                </a:r>
-                <a14:m>
-                  <m:oMath xmlns:m="http://schemas.openxmlformats.org/officeDocument/2006/math">
-                    <m:r>
-                      <a:rPr lang="en-US" i="1">
-                        <a:latin typeface="Cambria Math" panose="02040503050406030204" pitchFamily="18" charset="0"/>
-                      </a:rPr>
-                      <m:t>𝑃</m:t>
-                    </m:r>
-                  </m:oMath>
-                </a14:m>
-                <a:r>
-                  <a:rPr lang="en-US" dirty="0"/>
-                  <a:t> allows you to derive a proof of </a:t>
-                </a:r>
-                <a14:m>
-                  <m:oMath xmlns:m="http://schemas.openxmlformats.org/officeDocument/2006/math">
-                    <m:r>
-                      <a:rPr lang="en-US" i="1">
-                        <a:latin typeface="Cambria Math" panose="02040503050406030204" pitchFamily="18" charset="0"/>
-                      </a:rPr>
-                      <m:t>𝑄</m:t>
-                    </m:r>
-                  </m:oMath>
-                </a14:m>
-                <a:r>
-                  <a:rPr lang="en-US" dirty="0"/>
-                  <a:t>, then one can derive a proof of </a:t>
-                </a:r>
-                <a14:m>
-                  <m:oMath xmlns:m="http://schemas.openxmlformats.org/officeDocument/2006/math">
-                    <m:r>
-                      <a:rPr lang="en-US" i="1">
-                        <a:latin typeface="Cambria Math" panose="02040503050406030204" pitchFamily="18" charset="0"/>
-                      </a:rPr>
-                      <m:t>𝑃</m:t>
-                    </m:r>
-                    <m:r>
-                      <a:rPr lang="en-US" i="1">
-                        <a:latin typeface="Cambria Math" panose="02040503050406030204" pitchFamily="18" charset="0"/>
-                      </a:rPr>
-                      <m:t>→</m:t>
-                    </m:r>
-                    <m:r>
-                      <a:rPr lang="en-US" i="1">
-                        <a:latin typeface="Cambria Math" panose="02040503050406030204" pitchFamily="18" charset="0"/>
-                      </a:rPr>
-                      <m:t>𝑄</m:t>
-                    </m:r>
-                  </m:oMath>
-                </a14:m>
-                <a:r>
-                  <a:rPr lang="en-US" dirty="0"/>
-                  <a:t>, discharging the assumption. </a:t>
-                </a:r>
-              </a:p>
-              <a:p>
-                <a:r>
-                  <a:rPr lang="en-US" dirty="0"/>
-                  <a:t>To represent this rule as an inference rule, we need a notation to represent the idea that from an assumption that there is a proof of </a:t>
-                </a:r>
-                <a14:m>
-                  <m:oMath xmlns:m="http://schemas.openxmlformats.org/officeDocument/2006/math">
-                    <m:r>
-                      <a:rPr lang="en-US" i="1">
-                        <a:latin typeface="Cambria Math" panose="02040503050406030204" pitchFamily="18" charset="0"/>
-                      </a:rPr>
-                      <m:t>𝑃</m:t>
-                    </m:r>
-                  </m:oMath>
-                </a14:m>
-                <a:r>
-                  <a:rPr lang="en-US" dirty="0"/>
-                  <a:t> one can derive a proof of </a:t>
-                </a:r>
-                <a14:m>
-                  <m:oMath xmlns:m="http://schemas.openxmlformats.org/officeDocument/2006/math">
-                    <m:r>
-                      <a:rPr lang="en-US" i="1">
-                        <a:latin typeface="Cambria Math" panose="02040503050406030204" pitchFamily="18" charset="0"/>
-                      </a:rPr>
-                      <m:t>𝑄</m:t>
-                    </m:r>
-                  </m:oMath>
-                </a14:m>
-                <a:r>
-                  <a:rPr lang="en-US" dirty="0"/>
-                  <a:t>. If one has such a derivation then one can conclude </a:t>
-                </a:r>
-                <a14:m>
-                  <m:oMath xmlns:m="http://schemas.openxmlformats.org/officeDocument/2006/math">
-                    <m:r>
-                      <a:rPr lang="en-US" i="1">
-                        <a:latin typeface="Cambria Math" panose="02040503050406030204" pitchFamily="18" charset="0"/>
-                      </a:rPr>
-                      <m:t>𝑃</m:t>
-                    </m:r>
-                    <m:r>
-                      <a:rPr lang="en-US" i="1">
-                        <a:latin typeface="Cambria Math" panose="02040503050406030204" pitchFamily="18" charset="0"/>
-                      </a:rPr>
-                      <m:t>→</m:t>
-                    </m:r>
-                    <m:r>
-                      <a:rPr lang="en-US" i="1">
-                        <a:latin typeface="Cambria Math" panose="02040503050406030204" pitchFamily="18" charset="0"/>
-                      </a:rPr>
-                      <m:t>𝑄</m:t>
-                    </m:r>
-                  </m:oMath>
-                </a14:m>
-                <a:r>
-                  <a:rPr lang="en-US" dirty="0"/>
-                  <a:t>.</a:t>
-                </a:r>
-              </a:p>
-              <a:p>
-                <a:pPr lvl="1"/>
-                <a:r>
-                  <a:rPr lang="en-US" dirty="0"/>
-                  <a:t>The derivation is in essence a program</a:t>
-                </a:r>
-              </a:p>
-              <a:p>
-                <a:pPr lvl="1"/>
-                <a:r>
-                  <a:rPr lang="en-US" dirty="0"/>
-                  <a:t>The program is the proof of the proposition, which is of the type, </a:t>
-                </a:r>
-                <a14:m>
-                  <m:oMath xmlns:m="http://schemas.openxmlformats.org/officeDocument/2006/math">
-                    <m:r>
-                      <a:rPr lang="en-US" i="1">
-                        <a:latin typeface="Cambria Math" panose="02040503050406030204" pitchFamily="18" charset="0"/>
-                      </a:rPr>
-                      <m:t>𝑃</m:t>
-                    </m:r>
-                    <m:r>
-                      <a:rPr lang="en-US" i="1">
-                        <a:latin typeface="Cambria Math" panose="02040503050406030204" pitchFamily="18" charset="0"/>
-                      </a:rPr>
-                      <m:t>→</m:t>
-                    </m:r>
-                    <m:r>
-                      <a:rPr lang="en-US" i="1">
-                        <a:latin typeface="Cambria Math" panose="02040503050406030204" pitchFamily="18" charset="0"/>
-                      </a:rPr>
-                      <m:t>𝑄</m:t>
-                    </m:r>
-                  </m:oMath>
-                </a14:m>
-                <a:r>
-                  <a:rPr lang="en-US" dirty="0"/>
-                  <a:t>. </a:t>
-                </a:r>
-              </a:p>
-              <a:p>
-                <a:endParaRPr lang="en-US" dirty="0"/>
-              </a:p>
-            </p:txBody>
-          </p:sp>
-        </mc:Choice>
-        <mc:Fallback>
-          <p:sp>
-            <p:nvSpPr>
-              <p:cNvPr id="3" name="Content Placeholder 2">
-                <a:extLst>
-                  <a:ext uri="{FF2B5EF4-FFF2-40B4-BE49-F238E27FC236}">
-                    <a16:creationId xmlns:a16="http://schemas.microsoft.com/office/drawing/2014/main" id="{D8B0F1D2-6611-BE48-BDBD-52834D05CF3A}"/>
-                  </a:ext>
-                </a:extLst>
-              </p:cNvPr>
-              <p:cNvSpPr>
-                <a:spLocks noGrp="1" noRot="1" noChangeAspect="1" noMove="1" noResize="1" noEditPoints="1" noAdjustHandles="1" noChangeArrowheads="1" noChangeShapeType="1" noTextEdit="1"/>
-              </p:cNvSpPr>
-              <p:nvPr>
-                <p:ph idx="1"/>
-              </p:nvPr>
-            </p:nvSpPr>
-            <p:spPr>
-              <a:blipFill>
-                <a:blip r:embed="rId3"/>
-                <a:stretch>
-                  <a:fillRect l="-965" t="-2632" r="-1206"/>
-                </a:stretch>
-              </a:blipFill>
-            </p:spPr>
-            <p:txBody>
-              <a:bodyPr/>
-              <a:lstStyle/>
-              <a:p>
-                <a:r>
-                  <a:rPr lang="en-US">
-                    <a:noFill/>
-                  </a:rPr>
-                  <a:t> </a:t>
-                </a:r>
-              </a:p>
-            </p:txBody>
-          </p:sp>
-        </mc:Fallback>
-      </mc:AlternateContent>
-    </p:spTree>
-    <p:extLst>
-      <p:ext uri="{BB962C8B-B14F-4D97-AF65-F5344CB8AC3E}">
-        <p14:creationId xmlns:p14="http://schemas.microsoft.com/office/powerpoint/2010/main" val="3312621721"/>
-      </p:ext>
-    </p:extLst>
-  </p:cSld>
-  <p:clrMapOvr>
-    <a:masterClrMapping/>
-  </p:clrMapOvr>
-</p:sld>
-</file>
-
 <file path=ppt/slides/slide15.xml><?xml version="1.0" encoding="utf-8"?>
 <p:sld xmlns:a="http://schemas.openxmlformats.org/drawingml/2006/main" xmlns:r="http://schemas.openxmlformats.org/officeDocument/2006/relationships" xmlns:p="http://schemas.openxmlformats.org/presentationml/2006/main">
   <p:cSld>
@@ -5616,6 +5514,361 @@
                 </a14:m>
                 <a:r>
                   <a:rPr lang="en-US" dirty="0"/>
+                  <a:t> introduction rules</a:t>
+                </a:r>
+              </a:p>
+            </p:txBody>
+          </p:sp>
+        </mc:Choice>
+        <mc:Fallback>
+          <p:sp>
+            <p:nvSpPr>
+              <p:cNvPr id="2" name="Title 1">
+                <a:extLst>
+                  <a:ext uri="{FF2B5EF4-FFF2-40B4-BE49-F238E27FC236}">
+                    <a16:creationId xmlns:a16="http://schemas.microsoft.com/office/drawing/2014/main" id="{BAC9F285-0B24-ED44-8446-5DCC3786C121}"/>
+                  </a:ext>
+                </a:extLst>
+              </p:cNvPr>
+              <p:cNvSpPr>
+                <a:spLocks noGrp="1" noRot="1" noChangeAspect="1" noMove="1" noResize="1" noEditPoints="1" noAdjustHandles="1" noChangeArrowheads="1" noChangeShapeType="1" noTextEdit="1"/>
+              </p:cNvSpPr>
+              <p:nvPr>
+                <p:ph type="title"/>
+              </p:nvPr>
+            </p:nvSpPr>
+            <p:spPr>
+              <a:blipFill>
+                <a:blip r:embed="rId2"/>
+                <a:stretch>
+                  <a:fillRect l="-362"/>
+                </a:stretch>
+              </a:blipFill>
+            </p:spPr>
+            <p:txBody>
+              <a:bodyPr/>
+              <a:lstStyle/>
+              <a:p>
+                <a:r>
+                  <a:rPr lang="en-US">
+                    <a:noFill/>
+                  </a:rPr>
+                  <a:t> </a:t>
+                </a:r>
+              </a:p>
+            </p:txBody>
+          </p:sp>
+        </mc:Fallback>
+      </mc:AlternateContent>
+      <mc:AlternateContent xmlns:mc="http://schemas.openxmlformats.org/markup-compatibility/2006">
+        <mc:Choice xmlns:a14="http://schemas.microsoft.com/office/drawing/2010/main" Requires="a14">
+          <p:sp>
+            <p:nvSpPr>
+              <p:cNvPr id="3" name="Content Placeholder 2">
+                <a:extLst>
+                  <a:ext uri="{FF2B5EF4-FFF2-40B4-BE49-F238E27FC236}">
+                    <a16:creationId xmlns:a16="http://schemas.microsoft.com/office/drawing/2014/main" id="{D8B0F1D2-6611-BE48-BDBD-52834D05CF3A}"/>
+                  </a:ext>
+                </a:extLst>
+              </p:cNvPr>
+              <p:cNvSpPr>
+                <a:spLocks noGrp="1"/>
+              </p:cNvSpPr>
+              <p:nvPr>
+                <p:ph idx="1"/>
+              </p:nvPr>
+            </p:nvSpPr>
+            <p:spPr/>
+            <p:txBody>
+              <a:bodyPr>
+                <a:normAutofit/>
+              </a:bodyPr>
+              <a:lstStyle/>
+              <a:p>
+                <a:r>
+                  <a:rPr lang="en-US" dirty="0"/>
+                  <a:t>The </a:t>
+                </a:r>
+                <a14:m>
+                  <m:oMath xmlns:m="http://schemas.openxmlformats.org/officeDocument/2006/math">
+                    <m:r>
+                      <a:rPr lang="en-US" i="1">
+                        <a:latin typeface="Cambria Math" panose="02040503050406030204" pitchFamily="18" charset="0"/>
+                      </a:rPr>
+                      <m:t>→</m:t>
+                    </m:r>
+                  </m:oMath>
+                </a14:m>
+                <a:r>
+                  <a:rPr lang="en-US" dirty="0"/>
+                  <a:t> introduction rules say that if assuming that there is proof of </a:t>
+                </a:r>
+                <a14:m>
+                  <m:oMath xmlns:m="http://schemas.openxmlformats.org/officeDocument/2006/math">
+                    <m:r>
+                      <a:rPr lang="en-US" i="1">
+                        <a:latin typeface="Cambria Math" panose="02040503050406030204" pitchFamily="18" charset="0"/>
+                      </a:rPr>
+                      <m:t>𝑃</m:t>
+                    </m:r>
+                  </m:oMath>
+                </a14:m>
+                <a:r>
+                  <a:rPr lang="en-US" dirty="0"/>
+                  <a:t> allows you to derive a proof of </a:t>
+                </a:r>
+                <a14:m>
+                  <m:oMath xmlns:m="http://schemas.openxmlformats.org/officeDocument/2006/math">
+                    <m:r>
+                      <a:rPr lang="en-US" i="1">
+                        <a:latin typeface="Cambria Math" panose="02040503050406030204" pitchFamily="18" charset="0"/>
+                      </a:rPr>
+                      <m:t>𝑄</m:t>
+                    </m:r>
+                  </m:oMath>
+                </a14:m>
+                <a:r>
+                  <a:rPr lang="en-US" dirty="0"/>
+                  <a:t>, then one can derive a proof of </a:t>
+                </a:r>
+                <a14:m>
+                  <m:oMath xmlns:m="http://schemas.openxmlformats.org/officeDocument/2006/math">
+                    <m:r>
+                      <a:rPr lang="en-US" i="1">
+                        <a:latin typeface="Cambria Math" panose="02040503050406030204" pitchFamily="18" charset="0"/>
+                      </a:rPr>
+                      <m:t>𝑃</m:t>
+                    </m:r>
+                    <m:r>
+                      <a:rPr lang="en-US" i="1">
+                        <a:latin typeface="Cambria Math" panose="02040503050406030204" pitchFamily="18" charset="0"/>
+                      </a:rPr>
+                      <m:t>→</m:t>
+                    </m:r>
+                    <m:r>
+                      <a:rPr lang="en-US" i="1">
+                        <a:latin typeface="Cambria Math" panose="02040503050406030204" pitchFamily="18" charset="0"/>
+                      </a:rPr>
+                      <m:t>𝑄</m:t>
+                    </m:r>
+                  </m:oMath>
+                </a14:m>
+                <a:r>
+                  <a:rPr lang="en-US" dirty="0"/>
+                  <a:t>, discharging the assumption. </a:t>
+                </a:r>
+              </a:p>
+              <a:p>
+                <a:r>
+                  <a:rPr lang="en-US" dirty="0"/>
+                  <a:t>To represent this rule as an inference rule, we need a notation to represent the idea that from an assumption that there is a proof of </a:t>
+                </a:r>
+                <a14:m>
+                  <m:oMath xmlns:m="http://schemas.openxmlformats.org/officeDocument/2006/math">
+                    <m:r>
+                      <a:rPr lang="en-US" i="1">
+                        <a:latin typeface="Cambria Math" panose="02040503050406030204" pitchFamily="18" charset="0"/>
+                      </a:rPr>
+                      <m:t>𝑃</m:t>
+                    </m:r>
+                  </m:oMath>
+                </a14:m>
+                <a:r>
+                  <a:rPr lang="en-US" dirty="0"/>
+                  <a:t> one can derive a proof of </a:t>
+                </a:r>
+                <a14:m>
+                  <m:oMath xmlns:m="http://schemas.openxmlformats.org/officeDocument/2006/math">
+                    <m:r>
+                      <a:rPr lang="en-US" i="1">
+                        <a:latin typeface="Cambria Math" panose="02040503050406030204" pitchFamily="18" charset="0"/>
+                      </a:rPr>
+                      <m:t>𝑄</m:t>
+                    </m:r>
+                  </m:oMath>
+                </a14:m>
+                <a:r>
+                  <a:rPr lang="en-US" dirty="0"/>
+                  <a:t>. If one has such a derivation then one can conclude </a:t>
+                </a:r>
+                <a14:m>
+                  <m:oMath xmlns:m="http://schemas.openxmlformats.org/officeDocument/2006/math">
+                    <m:r>
+                      <a:rPr lang="en-US" i="1">
+                        <a:latin typeface="Cambria Math" panose="02040503050406030204" pitchFamily="18" charset="0"/>
+                      </a:rPr>
+                      <m:t>𝑃</m:t>
+                    </m:r>
+                    <m:r>
+                      <a:rPr lang="en-US" i="1">
+                        <a:latin typeface="Cambria Math" panose="02040503050406030204" pitchFamily="18" charset="0"/>
+                      </a:rPr>
+                      <m:t>→</m:t>
+                    </m:r>
+                    <m:r>
+                      <a:rPr lang="en-US" i="1">
+                        <a:latin typeface="Cambria Math" panose="02040503050406030204" pitchFamily="18" charset="0"/>
+                      </a:rPr>
+                      <m:t>𝑄</m:t>
+                    </m:r>
+                  </m:oMath>
+                </a14:m>
+                <a:r>
+                  <a:rPr lang="en-US" dirty="0"/>
+                  <a:t>.</a:t>
+                </a:r>
+              </a:p>
+              <a:p>
+                <a:pPr lvl="1"/>
+                <a:r>
+                  <a:rPr lang="en-US" dirty="0"/>
+                  <a:t>The derivation is in essence a program</a:t>
+                </a:r>
+              </a:p>
+              <a:p>
+                <a:pPr lvl="1"/>
+                <a:r>
+                  <a:rPr lang="en-US" dirty="0"/>
+                  <a:t>The program is the proof of the proposition, which is of the type, </a:t>
+                </a:r>
+                <a14:m>
+                  <m:oMath xmlns:m="http://schemas.openxmlformats.org/officeDocument/2006/math">
+                    <m:r>
+                      <a:rPr lang="en-US" i="1">
+                        <a:latin typeface="Cambria Math" panose="02040503050406030204" pitchFamily="18" charset="0"/>
+                      </a:rPr>
+                      <m:t>𝑃</m:t>
+                    </m:r>
+                    <m:r>
+                      <a:rPr lang="en-US" i="1">
+                        <a:latin typeface="Cambria Math" panose="02040503050406030204" pitchFamily="18" charset="0"/>
+                      </a:rPr>
+                      <m:t>→</m:t>
+                    </m:r>
+                    <m:r>
+                      <a:rPr lang="en-US" i="1">
+                        <a:latin typeface="Cambria Math" panose="02040503050406030204" pitchFamily="18" charset="0"/>
+                      </a:rPr>
+                      <m:t>𝑄</m:t>
+                    </m:r>
+                  </m:oMath>
+                </a14:m>
+                <a:r>
+                  <a:rPr lang="en-US" dirty="0"/>
+                  <a:t>. </a:t>
+                </a:r>
+              </a:p>
+              <a:p>
+                <a:endParaRPr lang="en-US" dirty="0"/>
+              </a:p>
+            </p:txBody>
+          </p:sp>
+        </mc:Choice>
+        <mc:Fallback>
+          <p:sp>
+            <p:nvSpPr>
+              <p:cNvPr id="3" name="Content Placeholder 2">
+                <a:extLst>
+                  <a:ext uri="{FF2B5EF4-FFF2-40B4-BE49-F238E27FC236}">
+                    <a16:creationId xmlns:a16="http://schemas.microsoft.com/office/drawing/2014/main" id="{D8B0F1D2-6611-BE48-BDBD-52834D05CF3A}"/>
+                  </a:ext>
+                </a:extLst>
+              </p:cNvPr>
+              <p:cNvSpPr>
+                <a:spLocks noGrp="1" noRot="1" noChangeAspect="1" noMove="1" noResize="1" noEditPoints="1" noAdjustHandles="1" noChangeArrowheads="1" noChangeShapeType="1" noTextEdit="1"/>
+              </p:cNvSpPr>
+              <p:nvPr>
+                <p:ph idx="1"/>
+              </p:nvPr>
+            </p:nvSpPr>
+            <p:spPr>
+              <a:blipFill>
+                <a:blip r:embed="rId3"/>
+                <a:stretch>
+                  <a:fillRect l="-965" t="-2632" r="-1206"/>
+                </a:stretch>
+              </a:blipFill>
+            </p:spPr>
+            <p:txBody>
+              <a:bodyPr/>
+              <a:lstStyle/>
+              <a:p>
+                <a:r>
+                  <a:rPr lang="en-US">
+                    <a:noFill/>
+                  </a:rPr>
+                  <a:t> </a:t>
+                </a:r>
+              </a:p>
+            </p:txBody>
+          </p:sp>
+        </mc:Fallback>
+      </mc:AlternateContent>
+    </p:spTree>
+    <p:extLst>
+      <p:ext uri="{BB962C8B-B14F-4D97-AF65-F5344CB8AC3E}">
+        <p14:creationId xmlns:p14="http://schemas.microsoft.com/office/powerpoint/2010/main" val="3312621721"/>
+      </p:ext>
+    </p:extLst>
+  </p:cSld>
+  <p:clrMapOvr>
+    <a:masterClrMapping/>
+  </p:clrMapOvr>
+</p:sld>
+</file>
+
+<file path=ppt/slides/slide16.xml><?xml version="1.0" encoding="utf-8"?>
+<p:sld xmlns:a="http://schemas.openxmlformats.org/drawingml/2006/main" xmlns:r="http://schemas.openxmlformats.org/officeDocument/2006/relationships" xmlns:p="http://schemas.openxmlformats.org/presentationml/2006/main">
+  <p:cSld>
+    <p:spTree>
+      <p:nvGrpSpPr>
+        <p:cNvPr id="1" name=""/>
+        <p:cNvGrpSpPr/>
+        <p:nvPr/>
+      </p:nvGrpSpPr>
+      <p:grpSpPr>
+        <a:xfrm>
+          <a:off x="0" y="0"/>
+          <a:ext cx="0" cy="0"/>
+          <a:chOff x="0" y="0"/>
+          <a:chExt cx="0" cy="0"/>
+        </a:xfrm>
+      </p:grpSpPr>
+      <mc:AlternateContent xmlns:mc="http://schemas.openxmlformats.org/markup-compatibility/2006">
+        <mc:Choice xmlns:a14="http://schemas.microsoft.com/office/drawing/2010/main" Requires="a14">
+          <p:sp>
+            <p:nvSpPr>
+              <p:cNvPr id="2" name="Title 1">
+                <a:extLst>
+                  <a:ext uri="{FF2B5EF4-FFF2-40B4-BE49-F238E27FC236}">
+                    <a16:creationId xmlns:a16="http://schemas.microsoft.com/office/drawing/2014/main" id="{BAC9F285-0B24-ED44-8446-5DCC3786C121}"/>
+                  </a:ext>
+                </a:extLst>
+              </p:cNvPr>
+              <p:cNvSpPr>
+                <a:spLocks noGrp="1"/>
+              </p:cNvSpPr>
+              <p:nvPr>
+                <p:ph type="title"/>
+              </p:nvPr>
+            </p:nvSpPr>
+            <p:spPr/>
+            <p:txBody>
+              <a:bodyPr/>
+              <a:lstStyle/>
+              <a:p>
+                <a14:m>
+                  <m:oMath xmlns:m="http://schemas.openxmlformats.org/officeDocument/2006/math">
+                    <m:r>
+                      <a:rPr lang="en-US" i="1">
+                        <a:latin typeface="Cambria Math" panose="02040503050406030204" pitchFamily="18" charset="0"/>
+                      </a:rPr>
+                      <m:t>→</m:t>
+                    </m:r>
+                  </m:oMath>
+                </a14:m>
+                <a:r>
+                  <a:rPr lang="en-US" dirty="0"/>
                   <a:t> introduction notation</a:t>
                 </a:r>
               </a:p>
@@ -5880,7 +6133,7 @@
 </p:sld>
 </file>
 
-<file path=ppt/slides/slide16.xml><?xml version="1.0" encoding="utf-8"?>
+<file path=ppt/slides/slide17.xml><?xml version="1.0" encoding="utf-8"?>
 <p:sld xmlns:a="http://schemas.openxmlformats.org/drawingml/2006/main" xmlns:r="http://schemas.openxmlformats.org/officeDocument/2006/relationships" xmlns:p="http://schemas.openxmlformats.org/presentationml/2006/main">
   <p:cSld>
     <p:spTree>
@@ -5919,12 +6172,8 @@
           <a:lstStyle/>
           <a:p>
             <a:r>
-              <a:rPr lang="en-US"/>
-              <a:t>Teaser: Alternate </a:t>
-            </a:r>
-            <a:r>
               <a:rPr lang="en-US" dirty="0"/>
-              <a:t>formulation</a:t>
+              <a:t>Teaser: Alternate formulation</a:t>
             </a:r>
             <a:br>
               <a:rPr lang="en-US" dirty="0"/>
@@ -7756,7 +8005,7 @@
 </p:sld>
 </file>
 
-<file path=ppt/slides/slide17.xml><?xml version="1.0" encoding="utf-8"?>
+<file path=ppt/slides/slide18.xml><?xml version="1.0" encoding="utf-8"?>
 <p:sld xmlns:a="http://schemas.openxmlformats.org/drawingml/2006/main" xmlns:r="http://schemas.openxmlformats.org/officeDocument/2006/relationships" xmlns:p="http://schemas.openxmlformats.org/presentationml/2006/main">
   <p:cSld>
     <p:bg>
@@ -9001,35 +9250,35 @@
                     <a:latin typeface="Courier New" panose="02070309020205020404" pitchFamily="49" charset="0"/>
                     <a:cs typeface="Courier New" panose="02070309020205020404" pitchFamily="49" charset="0"/>
                   </a:rPr>
-                  <a:t>{ R W : Prop }, </a:t>
+                  <a:t>{ P Q : Prop }, </a:t>
                 </a:r>
                 <a:r>
                   <a:rPr lang="en-US" sz="2000" dirty="0" err="1">
                     <a:latin typeface="Courier New" panose="02070309020205020404" pitchFamily="49" charset="0"/>
                     <a:cs typeface="Courier New" panose="02070309020205020404" pitchFamily="49" charset="0"/>
                   </a:rPr>
-                  <a:t>pfRtoW</a:t>
+                  <a:t>pfPtoQ</a:t>
                 </a:r>
                 <a:r>
                   <a:rPr lang="en-US" sz="2000" dirty="0">
                     <a:latin typeface="Courier New" panose="02070309020205020404" pitchFamily="49" charset="0"/>
                     <a:cs typeface="Courier New" panose="02070309020205020404" pitchFamily="49" charset="0"/>
                   </a:rPr>
-                  <a:t> : R → W, </a:t>
+                  <a:t> : P → Q, </a:t>
                 </a:r>
                 <a:r>
                   <a:rPr lang="en-US" sz="2000" dirty="0" err="1">
                     <a:latin typeface="Courier New" panose="02070309020205020404" pitchFamily="49" charset="0"/>
                     <a:cs typeface="Courier New" panose="02070309020205020404" pitchFamily="49" charset="0"/>
                   </a:rPr>
-                  <a:t>pfR</a:t>
+                  <a:t>pfP</a:t>
                 </a:r>
                 <a:r>
                   <a:rPr lang="en-US" sz="2000" dirty="0">
                     <a:latin typeface="Courier New" panose="02070309020205020404" pitchFamily="49" charset="0"/>
                     <a:cs typeface="Courier New" panose="02070309020205020404" pitchFamily="49" charset="0"/>
                   </a:rPr>
-                  <a:t> : R</a:t>
+                  <a:t> : P</a:t>
                 </a:r>
               </a:p>
               <a:p>
@@ -9067,14 +9316,14 @@
                     <a:latin typeface="Courier New" panose="02070309020205020404" pitchFamily="49" charset="0"/>
                     <a:cs typeface="Courier New" panose="02070309020205020404" pitchFamily="49" charset="0"/>
                   </a:rPr>
-                  <a:t>pfW</a:t>
+                  <a:t>pfQ</a:t>
                 </a:r>
                 <a:r>
                   <a:rPr lang="en-US" sz="2000" dirty="0">
                     <a:latin typeface="Courier New" panose="02070309020205020404" pitchFamily="49" charset="0"/>
                     <a:cs typeface="Courier New" panose="02070309020205020404" pitchFamily="49" charset="0"/>
                   </a:rPr>
-                  <a:t>: W </a:t>
+                  <a:t>: Q </a:t>
                 </a:r>
               </a:p>
               <a:p>
@@ -9117,35 +9366,35 @@
                     <a:latin typeface="Courier New" panose="02070309020205020404" pitchFamily="49" charset="0"/>
                     <a:cs typeface="Courier New" panose="02070309020205020404" pitchFamily="49" charset="0"/>
                   </a:rPr>
-                  <a:t>      (R W: Prop) (</a:t>
+                  <a:t>      (P Q: Prop) (</a:t>
                 </a:r>
                 <a:r>
                   <a:rPr lang="en-US" sz="2000" dirty="0" err="1">
                     <a:latin typeface="Courier New" panose="02070309020205020404" pitchFamily="49" charset="0"/>
                     <a:cs typeface="Courier New" panose="02070309020205020404" pitchFamily="49" charset="0"/>
                   </a:rPr>
-                  <a:t>pfRtopfW</a:t>
+                  <a:t>pfPtopfQ</a:t>
                 </a:r>
                 <a:r>
                   <a:rPr lang="en-US" sz="2000" dirty="0">
                     <a:latin typeface="Courier New" panose="02070309020205020404" pitchFamily="49" charset="0"/>
                     <a:cs typeface="Courier New" panose="02070309020205020404" pitchFamily="49" charset="0"/>
                   </a:rPr>
-                  <a:t> : R → W) (</a:t>
+                  <a:t> : P → Q) (</a:t>
                 </a:r>
                 <a:r>
                   <a:rPr lang="en-US" sz="2000" dirty="0" err="1">
                     <a:latin typeface="Courier New" panose="02070309020205020404" pitchFamily="49" charset="0"/>
                     <a:cs typeface="Courier New" panose="02070309020205020404" pitchFamily="49" charset="0"/>
                   </a:rPr>
-                  <a:t>pfR</a:t>
+                  <a:t>pfP</a:t>
                 </a:r>
                 <a:r>
                   <a:rPr lang="en-US" sz="2000" dirty="0">
                     <a:latin typeface="Courier New" panose="02070309020205020404" pitchFamily="49" charset="0"/>
                     <a:cs typeface="Courier New" panose="02070309020205020404" pitchFamily="49" charset="0"/>
                   </a:rPr>
-                  <a:t> : R) </a:t>
+                  <a:t> : P) </a:t>
                 </a:r>
                 <a:br>
                   <a:rPr lang="en-US" sz="2000" dirty="0">
@@ -9158,14 +9407,14 @@
                     <a:latin typeface="Courier New" panose="02070309020205020404" pitchFamily="49" charset="0"/>
                     <a:cs typeface="Courier New" panose="02070309020205020404" pitchFamily="49" charset="0"/>
                   </a:rPr>
-                  <a:t>      : W := </a:t>
+                  <a:t>      : Q := </a:t>
                 </a:r>
                 <a:r>
                   <a:rPr lang="en-US" sz="2000" dirty="0" err="1">
                     <a:latin typeface="Courier New" panose="02070309020205020404" pitchFamily="49" charset="0"/>
                     <a:cs typeface="Courier New" panose="02070309020205020404" pitchFamily="49" charset="0"/>
                   </a:rPr>
-                  <a:t>pfRtopfW</a:t>
+                  <a:t>pfPtopfQ</a:t>
                 </a:r>
                 <a:r>
                   <a:rPr lang="en-US" sz="2000" dirty="0">
@@ -9179,7 +9428,7 @@
                     <a:latin typeface="Courier New" panose="02070309020205020404" pitchFamily="49" charset="0"/>
                     <a:cs typeface="Courier New" panose="02070309020205020404" pitchFamily="49" charset="0"/>
                   </a:rPr>
-                  <a:t>pfR</a:t>
+                  <a:t>pfP</a:t>
                 </a:r>
                 <a:endParaRPr lang="en-US" sz="2000" dirty="0">
                   <a:latin typeface="Courier New" panose="02070309020205020404" pitchFamily="49" charset="0"/>
@@ -9267,6 +9516,283 @@
           <p:cNvPr id="2" name="Title 1">
             <a:extLst>
               <a:ext uri="{FF2B5EF4-FFF2-40B4-BE49-F238E27FC236}">
+                <a16:creationId xmlns:a16="http://schemas.microsoft.com/office/drawing/2014/main" id="{D514D39C-6EDC-A84B-8029-DA26275BEDDB}"/>
+              </a:ext>
+            </a:extLst>
+          </p:cNvPr>
+          <p:cNvSpPr>
+            <a:spLocks noGrp="1"/>
+          </p:cNvSpPr>
+          <p:nvPr>
+            <p:ph type="title"/>
+          </p:nvPr>
+        </p:nvSpPr>
+        <p:spPr/>
+        <p:txBody>
+          <a:bodyPr/>
+          <a:lstStyle/>
+          <a:p>
+            <a:r>
+              <a:rPr lang="en-US" dirty="0"/>
+              <a:t>Modus Tollens</a:t>
+            </a:r>
+          </a:p>
+        </p:txBody>
+      </p:sp>
+      <mc:AlternateContent xmlns:mc="http://schemas.openxmlformats.org/markup-compatibility/2006">
+        <mc:Choice xmlns:a14="http://schemas.microsoft.com/office/drawing/2010/main" Requires="a14">
+          <p:sp>
+            <p:nvSpPr>
+              <p:cNvPr id="3" name="Content Placeholder 2">
+                <a:extLst>
+                  <a:ext uri="{FF2B5EF4-FFF2-40B4-BE49-F238E27FC236}">
+                    <a16:creationId xmlns:a16="http://schemas.microsoft.com/office/drawing/2014/main" id="{659447E1-6E81-1D43-AB21-323A5E8372F4}"/>
+                  </a:ext>
+                </a:extLst>
+              </p:cNvPr>
+              <p:cNvSpPr>
+                <a:spLocks noGrp="1"/>
+              </p:cNvSpPr>
+              <p:nvPr>
+                <p:ph idx="1"/>
+              </p:nvPr>
+            </p:nvSpPr>
+            <p:spPr/>
+            <p:txBody>
+              <a:bodyPr/>
+              <a:lstStyle/>
+              <a:p>
+                <a:r>
+                  <a:rPr lang="en-US" dirty="0"/>
+                  <a:t>Fancy phrase meaning: if we know </a:t>
+                </a:r>
+                <a14:m>
+                  <m:oMath xmlns:m="http://schemas.openxmlformats.org/officeDocument/2006/math">
+                    <m:r>
+                      <a:rPr lang="en-US" i="1">
+                        <a:latin typeface="Cambria Math" panose="02040503050406030204" pitchFamily="18" charset="0"/>
+                      </a:rPr>
+                      <m:t>𝑃</m:t>
+                    </m:r>
+                    <m:r>
+                      <a:rPr lang="en-US" i="1">
+                        <a:latin typeface="Cambria Math" panose="02040503050406030204" pitchFamily="18" charset="0"/>
+                      </a:rPr>
+                      <m:t>→</m:t>
+                    </m:r>
+                    <m:r>
+                      <a:rPr lang="en-US" i="1">
+                        <a:latin typeface="Cambria Math" panose="02040503050406030204" pitchFamily="18" charset="0"/>
+                      </a:rPr>
+                      <m:t>𝑄</m:t>
+                    </m:r>
+                  </m:oMath>
+                </a14:m>
+                <a:r>
+                  <a:rPr lang="en-US" dirty="0"/>
+                  <a:t> is true and we know </a:t>
+                </a:r>
+                <a14:m>
+                  <m:oMath xmlns:m="http://schemas.openxmlformats.org/officeDocument/2006/math">
+                    <m:r>
+                      <a:rPr lang="en-US" b="0" i="1" smtClean="0">
+                        <a:latin typeface="Cambria Math" panose="02040503050406030204" pitchFamily="18" charset="0"/>
+                      </a:rPr>
+                      <m:t>𝑄</m:t>
+                    </m:r>
+                  </m:oMath>
+                </a14:m>
+                <a:r>
+                  <a:rPr lang="en-US" dirty="0"/>
+                  <a:t> is </a:t>
+                </a:r>
+                <a:r>
+                  <a:rPr lang="en-US" i="1" dirty="0"/>
+                  <a:t>not</a:t>
+                </a:r>
+                <a:r>
+                  <a:rPr lang="en-US" dirty="0"/>
+                  <a:t> true, then we know </a:t>
+                </a:r>
+                <a14:m>
+                  <m:oMath xmlns:m="http://schemas.openxmlformats.org/officeDocument/2006/math">
+                    <m:r>
+                      <a:rPr lang="en-US" b="0" i="1" smtClean="0">
+                        <a:latin typeface="Cambria Math" panose="02040503050406030204" pitchFamily="18" charset="0"/>
+                      </a:rPr>
+                      <m:t>𝑃</m:t>
+                    </m:r>
+                  </m:oMath>
+                </a14:m>
+                <a:r>
+                  <a:rPr lang="en-US" dirty="0"/>
+                  <a:t> cannot be true</a:t>
+                </a:r>
+              </a:p>
+              <a:p>
+                <a:pPr marL="457200" lvl="1" indent="0">
+                  <a:buNone/>
+                </a:pPr>
+                <a:r>
+                  <a:rPr lang="en-US" sz="2000" dirty="0">
+                    <a:latin typeface="Courier New" panose="02070309020205020404" pitchFamily="49" charset="0"/>
+                    <a:cs typeface="Courier New" panose="02070309020205020404" pitchFamily="49" charset="0"/>
+                  </a:rPr>
+                  <a:t>{ P Q : Prop }, </a:t>
+                </a:r>
+                <a:r>
+                  <a:rPr lang="en-US" sz="2000" dirty="0" err="1">
+                    <a:latin typeface="Courier New" panose="02070309020205020404" pitchFamily="49" charset="0"/>
+                    <a:cs typeface="Courier New" panose="02070309020205020404" pitchFamily="49" charset="0"/>
+                  </a:rPr>
+                  <a:t>pfPtoQ</a:t>
+                </a:r>
+                <a:r>
+                  <a:rPr lang="en-US" sz="2000" dirty="0">
+                    <a:latin typeface="Courier New" panose="02070309020205020404" pitchFamily="49" charset="0"/>
+                    <a:cs typeface="Courier New" panose="02070309020205020404" pitchFamily="49" charset="0"/>
+                  </a:rPr>
+                  <a:t> : P → Q, </a:t>
+                </a:r>
+                <a:r>
+                  <a:rPr lang="en-US" sz="2000" dirty="0" err="1">
+                    <a:latin typeface="Courier New" panose="02070309020205020404" pitchFamily="49" charset="0"/>
+                    <a:cs typeface="Courier New" panose="02070309020205020404" pitchFamily="49" charset="0"/>
+                  </a:rPr>
+                  <a:t>pfnQ</a:t>
+                </a:r>
+                <a:r>
+                  <a:rPr lang="en-US" sz="2000" dirty="0">
+                    <a:latin typeface="Courier New" panose="02070309020205020404" pitchFamily="49" charset="0"/>
+                    <a:cs typeface="Courier New" panose="02070309020205020404" pitchFamily="49" charset="0"/>
+                  </a:rPr>
+                  <a:t> : ¬Q</a:t>
+                </a:r>
+              </a:p>
+              <a:p>
+                <a:pPr marL="457200" lvl="1" indent="0">
+                  <a:buNone/>
+                </a:pPr>
+                <a:r>
+                  <a:rPr lang="en-US" sz="2000" dirty="0">
+                    <a:latin typeface="Courier New" panose="02070309020205020404" pitchFamily="49" charset="0"/>
+                    <a:cs typeface="Courier New" panose="02070309020205020404" pitchFamily="49" charset="0"/>
+                  </a:rPr>
+                  <a:t>----------------------------------------- (modus-tollens)</a:t>
+                </a:r>
+              </a:p>
+              <a:p>
+                <a:pPr marL="457200" lvl="1" indent="0">
+                  <a:buNone/>
+                </a:pPr>
+                <a:r>
+                  <a:rPr lang="en-US" sz="2000" dirty="0" err="1">
+                    <a:latin typeface="Courier New" panose="02070309020205020404" pitchFamily="49" charset="0"/>
+                    <a:cs typeface="Courier New" panose="02070309020205020404" pitchFamily="49" charset="0"/>
+                  </a:rPr>
+                  <a:t>pfnP</a:t>
+                </a:r>
+                <a:r>
+                  <a:rPr lang="en-US" sz="2000" dirty="0">
+                    <a:latin typeface="Courier New" panose="02070309020205020404" pitchFamily="49" charset="0"/>
+                    <a:cs typeface="Courier New" panose="02070309020205020404" pitchFamily="49" charset="0"/>
+                  </a:rPr>
+                  <a:t>: ¬P</a:t>
+                </a:r>
+              </a:p>
+              <a:p>
+                <a:r>
+                  <a:rPr lang="en-US" dirty="0"/>
+                  <a:t>If we know that “if it’s raining, then the streets are wet”, and we know that “the streets are not wet”, then we know “it's not raining”</a:t>
+                </a:r>
+              </a:p>
+              <a:p>
+                <a:r>
+                  <a:rPr lang="en-US" dirty="0"/>
+                  <a:t>This relies on proof by contradiction, which we will discuss later</a:t>
+                </a:r>
+              </a:p>
+              <a:p>
+                <a:endParaRPr lang="en-US" dirty="0"/>
+              </a:p>
+            </p:txBody>
+          </p:sp>
+        </mc:Choice>
+        <mc:Fallback>
+          <p:sp>
+            <p:nvSpPr>
+              <p:cNvPr id="3" name="Content Placeholder 2">
+                <a:extLst>
+                  <a:ext uri="{FF2B5EF4-FFF2-40B4-BE49-F238E27FC236}">
+                    <a16:creationId xmlns:a16="http://schemas.microsoft.com/office/drawing/2014/main" id="{659447E1-6E81-1D43-AB21-323A5E8372F4}"/>
+                  </a:ext>
+                </a:extLst>
+              </p:cNvPr>
+              <p:cNvSpPr>
+                <a:spLocks noGrp="1" noRot="1" noChangeAspect="1" noMove="1" noResize="1" noEditPoints="1" noAdjustHandles="1" noChangeArrowheads="1" noChangeShapeType="1" noTextEdit="1"/>
+              </p:cNvSpPr>
+              <p:nvPr>
+                <p:ph idx="1"/>
+              </p:nvPr>
+            </p:nvSpPr>
+            <p:spPr>
+              <a:blipFill>
+                <a:blip r:embed="rId2"/>
+                <a:stretch>
+                  <a:fillRect l="-965" t="-2632" r="-1930"/>
+                </a:stretch>
+              </a:blipFill>
+            </p:spPr>
+            <p:txBody>
+              <a:bodyPr/>
+              <a:lstStyle/>
+              <a:p>
+                <a:r>
+                  <a:rPr lang="en-US">
+                    <a:noFill/>
+                  </a:rPr>
+                  <a:t> </a:t>
+                </a:r>
+              </a:p>
+            </p:txBody>
+          </p:sp>
+        </mc:Fallback>
+      </mc:AlternateContent>
+    </p:spTree>
+    <p:extLst>
+      <p:ext uri="{BB962C8B-B14F-4D97-AF65-F5344CB8AC3E}">
+        <p14:creationId xmlns:p14="http://schemas.microsoft.com/office/powerpoint/2010/main" val="957333694"/>
+      </p:ext>
+    </p:extLst>
+  </p:cSld>
+  <p:clrMapOvr>
+    <a:masterClrMapping/>
+  </p:clrMapOvr>
+</p:sld>
+</file>
+
+<file path=ppt/slides/slide6.xml><?xml version="1.0" encoding="utf-8"?>
+<p:sld xmlns:a="http://schemas.openxmlformats.org/drawingml/2006/main" xmlns:r="http://schemas.openxmlformats.org/officeDocument/2006/relationships" xmlns:p="http://schemas.openxmlformats.org/presentationml/2006/main">
+  <p:cSld>
+    <p:spTree>
+      <p:nvGrpSpPr>
+        <p:cNvPr id="1" name=""/>
+        <p:cNvGrpSpPr/>
+        <p:nvPr/>
+      </p:nvGrpSpPr>
+      <p:grpSpPr>
+        <a:xfrm>
+          <a:off x="0" y="0"/>
+          <a:ext cx="0" cy="0"/>
+          <a:chOff x="0" y="0"/>
+          <a:chExt cx="0" cy="0"/>
+        </a:xfrm>
+      </p:grpSpPr>
+      <p:sp>
+        <p:nvSpPr>
+          <p:cNvPr id="2" name="Title 1">
+            <a:extLst>
+              <a:ext uri="{FF2B5EF4-FFF2-40B4-BE49-F238E27FC236}">
                 <a16:creationId xmlns:a16="http://schemas.microsoft.com/office/drawing/2014/main" id="{F99AE391-B459-5346-BA87-471A4C17DEAF}"/>
               </a:ext>
             </a:extLst>
@@ -9640,7 +10166,7 @@
 </p:sld>
 </file>
 
-<file path=ppt/slides/slide6.xml><?xml version="1.0" encoding="utf-8"?>
+<file path=ppt/slides/slide7.xml><?xml version="1.0" encoding="utf-8"?>
 <p:sld xmlns:a="http://schemas.openxmlformats.org/drawingml/2006/main" xmlns:r="http://schemas.openxmlformats.org/officeDocument/2006/relationships" xmlns:p="http://schemas.openxmlformats.org/presentationml/2006/main">
   <p:cSld>
     <p:spTree>
@@ -10059,7 +10585,7 @@
 </p:sld>
 </file>
 
-<file path=ppt/slides/slide7.xml><?xml version="1.0" encoding="utf-8"?>
+<file path=ppt/slides/slide8.xml><?xml version="1.0" encoding="utf-8"?>
 <p:sld xmlns:a="http://schemas.openxmlformats.org/drawingml/2006/main" xmlns:r="http://schemas.openxmlformats.org/officeDocument/2006/relationships" xmlns:p="http://schemas.openxmlformats.org/presentationml/2006/main">
   <p:cSld>
     <p:spTree>
@@ -10384,7 +10910,7 @@
 </p:sld>
 </file>
 
-<file path=ppt/slides/slide8.xml><?xml version="1.0" encoding="utf-8"?>
+<file path=ppt/slides/slide9.xml><?xml version="1.0" encoding="utf-8"?>
 <p:sld xmlns:a="http://schemas.openxmlformats.org/drawingml/2006/main" xmlns:r="http://schemas.openxmlformats.org/officeDocument/2006/relationships" xmlns:p="http://schemas.openxmlformats.org/presentationml/2006/main">
   <p:cSld>
     <p:spTree>
@@ -10690,226 +11216,6 @@
     <p:extLst>
       <p:ext uri="{BB962C8B-B14F-4D97-AF65-F5344CB8AC3E}">
         <p14:creationId xmlns:p14="http://schemas.microsoft.com/office/powerpoint/2010/main" val="4292920572"/>
-      </p:ext>
-    </p:extLst>
-  </p:cSld>
-  <p:clrMapOvr>
-    <a:masterClrMapping/>
-  </p:clrMapOvr>
-</p:sld>
-</file>
-
-<file path=ppt/slides/slide9.xml><?xml version="1.0" encoding="utf-8"?>
-<p:sld xmlns:a="http://schemas.openxmlformats.org/drawingml/2006/main" xmlns:r="http://schemas.openxmlformats.org/officeDocument/2006/relationships" xmlns:p="http://schemas.openxmlformats.org/presentationml/2006/main">
-  <p:cSld>
-    <p:spTree>
-      <p:nvGrpSpPr>
-        <p:cNvPr id="1" name=""/>
-        <p:cNvGrpSpPr/>
-        <p:nvPr/>
-      </p:nvGrpSpPr>
-      <p:grpSpPr>
-        <a:xfrm>
-          <a:off x="0" y="0"/>
-          <a:ext cx="0" cy="0"/>
-          <a:chOff x="0" y="0"/>
-          <a:chExt cx="0" cy="0"/>
-        </a:xfrm>
-      </p:grpSpPr>
-      <mc:AlternateContent xmlns:mc="http://schemas.openxmlformats.org/markup-compatibility/2006">
-        <mc:Choice xmlns:a14="http://schemas.microsoft.com/office/drawing/2010/main" Requires="a14">
-          <p:sp>
-            <p:nvSpPr>
-              <p:cNvPr id="2" name="Title 1">
-                <a:extLst>
-                  <a:ext uri="{FF2B5EF4-FFF2-40B4-BE49-F238E27FC236}">
-                    <a16:creationId xmlns:a16="http://schemas.microsoft.com/office/drawing/2014/main" id="{1CE23325-16EF-B648-A91A-1BC50D6D0E94}"/>
-                  </a:ext>
-                </a:extLst>
-              </p:cNvPr>
-              <p:cNvSpPr>
-                <a:spLocks noGrp="1"/>
-              </p:cNvSpPr>
-              <p:nvPr>
-                <p:ph type="title"/>
-              </p:nvPr>
-            </p:nvSpPr>
-            <p:spPr/>
-            <p:txBody>
-              <a:bodyPr/>
-              <a:lstStyle/>
-              <a:p>
-                <a:r>
-                  <a:rPr lang="en-US" dirty="0"/>
-                  <a:t>Proof of true </a:t>
-                </a:r>
-                <a14:m>
-                  <m:oMath xmlns:m="http://schemas.openxmlformats.org/officeDocument/2006/math">
-                    <m:r>
-                      <a:rPr lang="en-US" i="1">
-                        <a:latin typeface="Cambria Math" panose="02040503050406030204" pitchFamily="18" charset="0"/>
-                      </a:rPr>
-                      <m:t>→</m:t>
-                    </m:r>
-                  </m:oMath>
-                </a14:m>
-                <a:r>
-                  <a:rPr lang="en-US" dirty="0"/>
-                  <a:t> true </a:t>
-                </a:r>
-              </a:p>
-            </p:txBody>
-          </p:sp>
-        </mc:Choice>
-        <mc:Fallback>
-          <p:sp>
-            <p:nvSpPr>
-              <p:cNvPr id="2" name="Title 1">
-                <a:extLst>
-                  <a:ext uri="{FF2B5EF4-FFF2-40B4-BE49-F238E27FC236}">
-                    <a16:creationId xmlns:a16="http://schemas.microsoft.com/office/drawing/2014/main" id="{1CE23325-16EF-B648-A91A-1BC50D6D0E94}"/>
-                  </a:ext>
-                </a:extLst>
-              </p:cNvPr>
-              <p:cNvSpPr>
-                <a:spLocks noGrp="1" noRot="1" noChangeAspect="1" noMove="1" noResize="1" noEditPoints="1" noAdjustHandles="1" noChangeArrowheads="1" noChangeShapeType="1" noTextEdit="1"/>
-              </p:cNvSpPr>
-              <p:nvPr>
-                <p:ph type="title"/>
-              </p:nvPr>
-            </p:nvSpPr>
-            <p:spPr>
-              <a:blipFill>
-                <a:blip r:embed="rId2"/>
-                <a:stretch>
-                  <a:fillRect l="-2292"/>
-                </a:stretch>
-              </a:blipFill>
-            </p:spPr>
-            <p:txBody>
-              <a:bodyPr/>
-              <a:lstStyle/>
-              <a:p>
-                <a:r>
-                  <a:rPr lang="en-US">
-                    <a:noFill/>
-                  </a:rPr>
-                  <a:t> </a:t>
-                </a:r>
-              </a:p>
-            </p:txBody>
-          </p:sp>
-        </mc:Fallback>
-      </mc:AlternateContent>
-      <p:sp>
-        <p:nvSpPr>
-          <p:cNvPr id="3" name="Content Placeholder 2">
-            <a:extLst>
-              <a:ext uri="{FF2B5EF4-FFF2-40B4-BE49-F238E27FC236}">
-                <a16:creationId xmlns:a16="http://schemas.microsoft.com/office/drawing/2014/main" id="{4F2A30D4-3683-3149-A141-3690026BFD9B}"/>
-              </a:ext>
-            </a:extLst>
-          </p:cNvPr>
-          <p:cNvSpPr>
-            <a:spLocks noGrp="1"/>
-          </p:cNvSpPr>
-          <p:nvPr>
-            <p:ph idx="1"/>
-          </p:nvPr>
-        </p:nvSpPr>
-        <p:spPr/>
-        <p:txBody>
-          <a:bodyPr/>
-          <a:lstStyle/>
-          <a:p>
-            <a:pPr marL="0" indent="0">
-              <a:buNone/>
-            </a:pPr>
-            <a:r>
-              <a:rPr lang="en-US" sz="2400" dirty="0">
-                <a:latin typeface="Courier New" panose="02070309020205020404" pitchFamily="49" charset="0"/>
-                <a:cs typeface="Courier New" panose="02070309020205020404" pitchFamily="49" charset="0"/>
-              </a:rPr>
-              <a:t>def </a:t>
-            </a:r>
-            <a:r>
-              <a:rPr lang="en-US" sz="2400" dirty="0" err="1">
-                <a:latin typeface="Courier New" panose="02070309020205020404" pitchFamily="49" charset="0"/>
-                <a:cs typeface="Courier New" panose="02070309020205020404" pitchFamily="49" charset="0"/>
-              </a:rPr>
-              <a:t>timpt</a:t>
-            </a:r>
-            <a:r>
-              <a:rPr lang="en-US" sz="2400" dirty="0">
-                <a:latin typeface="Courier New" panose="02070309020205020404" pitchFamily="49" charset="0"/>
-                <a:cs typeface="Courier New" panose="02070309020205020404" pitchFamily="49" charset="0"/>
-              </a:rPr>
-              <a:t> ( </a:t>
-            </a:r>
-            <a:r>
-              <a:rPr lang="en-US" sz="2400" dirty="0" err="1">
-                <a:latin typeface="Courier New" panose="02070309020205020404" pitchFamily="49" charset="0"/>
-                <a:cs typeface="Courier New" panose="02070309020205020404" pitchFamily="49" charset="0"/>
-              </a:rPr>
-              <a:t>pf_true</a:t>
-            </a:r>
-            <a:r>
-              <a:rPr lang="en-US" sz="2400" dirty="0">
-                <a:latin typeface="Courier New" panose="02070309020205020404" pitchFamily="49" charset="0"/>
-                <a:cs typeface="Courier New" panose="02070309020205020404" pitchFamily="49" charset="0"/>
-              </a:rPr>
-              <a:t>: true ) : true := </a:t>
-            </a:r>
-            <a:r>
-              <a:rPr lang="en-US" sz="2400" dirty="0" err="1">
-                <a:latin typeface="Courier New" panose="02070309020205020404" pitchFamily="49" charset="0"/>
-                <a:cs typeface="Courier New" panose="02070309020205020404" pitchFamily="49" charset="0"/>
-              </a:rPr>
-              <a:t>pf_true</a:t>
-            </a:r>
-            <a:endParaRPr lang="en-US" sz="2400" dirty="0">
-              <a:latin typeface="Courier New" panose="02070309020205020404" pitchFamily="49" charset="0"/>
-              <a:cs typeface="Courier New" panose="02070309020205020404" pitchFamily="49" charset="0"/>
-            </a:endParaRPr>
-          </a:p>
-          <a:p>
-            <a:pPr marL="0" indent="0">
-              <a:buNone/>
-            </a:pPr>
-            <a:br>
-              <a:rPr lang="en-US" sz="2400" dirty="0">
-                <a:latin typeface="Courier New" panose="02070309020205020404" pitchFamily="49" charset="0"/>
-                <a:cs typeface="Courier New" panose="02070309020205020404" pitchFamily="49" charset="0"/>
-              </a:rPr>
-            </a:br>
-            <a:r>
-              <a:rPr lang="en-US" sz="2400" dirty="0">
-                <a:latin typeface="Courier New" panose="02070309020205020404" pitchFamily="49" charset="0"/>
-                <a:cs typeface="Courier New" panose="02070309020205020404" pitchFamily="49" charset="0"/>
-              </a:rPr>
-              <a:t>#check </a:t>
-            </a:r>
-            <a:r>
-              <a:rPr lang="en-US" sz="2400" dirty="0" err="1">
-                <a:latin typeface="Courier New" panose="02070309020205020404" pitchFamily="49" charset="0"/>
-                <a:cs typeface="Courier New" panose="02070309020205020404" pitchFamily="49" charset="0"/>
-              </a:rPr>
-              <a:t>timpt</a:t>
-            </a:r>
-            <a:endParaRPr lang="en-US" sz="2400" dirty="0">
-              <a:latin typeface="Courier New" panose="02070309020205020404" pitchFamily="49" charset="0"/>
-              <a:cs typeface="Courier New" panose="02070309020205020404" pitchFamily="49" charset="0"/>
-            </a:endParaRPr>
-          </a:p>
-          <a:p>
-            <a:endParaRPr lang="en-US" dirty="0"/>
-          </a:p>
-        </p:txBody>
-      </p:sp>
-    </p:spTree>
-    <p:extLst>
-      <p:ext uri="{BB962C8B-B14F-4D97-AF65-F5344CB8AC3E}">
-        <p14:creationId xmlns:p14="http://schemas.microsoft.com/office/powerpoint/2010/main" val="903477720"/>
       </p:ext>
     </p:extLst>
   </p:cSld>

</xml_diff>